<commit_message>
fix animation on mouse clikc in presentation
</commit_message>
<xml_diff>
--- a/food-center/docs/mid_sem.pptx
+++ b/food-center/docs/mid_sem.pptx
@@ -4063,6 +4063,65 @@
           <a:chExt cx="0" cy="0"/>
         </a:xfrm>
       </p:grpSpPr>
+      <p:pic>
+        <p:nvPicPr>
+          <p:cNvPr id="4" name="Content Placeholder 3"/>
+          <p:cNvPicPr>
+            <a:picLocks noChangeAspect="1"/>
+          </p:cNvPicPr>
+          <p:nvPr/>
+        </p:nvPicPr>
+        <p:blipFill rotWithShape="1">
+          <a:blip r:embed="rId2">
+            <a:extLst>
+              <a:ext uri="{28A0092B-C50C-407E-A947-70E740481C1C}">
+                <a14:useLocalDpi xmlns:a14="http://schemas.microsoft.com/office/drawing/2010/main" val="0"/>
+              </a:ext>
+            </a:extLst>
+          </a:blip>
+          <a:srcRect l="22863" t="-234" r="20556" b="2577"/>
+          <a:stretch/>
+        </p:blipFill>
+        <p:spPr>
+          <a:xfrm>
+            <a:off x="395536" y="1653247"/>
+            <a:ext cx="2952328" cy="5139141"/>
+          </a:xfrm>
+          <a:prstGeom prst="rect">
+            <a:avLst/>
+          </a:prstGeom>
+        </p:spPr>
+      </p:pic>
+      <p:sp>
+        <p:nvSpPr>
+          <p:cNvPr id="52" name="TextBox 51"/>
+          <p:cNvSpPr txBox="1"/>
+          <p:nvPr/>
+        </p:nvSpPr>
+        <p:spPr>
+          <a:xfrm>
+            <a:off x="1216656" y="2660317"/>
+            <a:ext cx="1384768" cy="369332"/>
+          </a:xfrm>
+          <a:prstGeom prst="rect">
+            <a:avLst/>
+          </a:prstGeom>
+          <a:noFill/>
+        </p:spPr>
+        <p:txBody>
+          <a:bodyPr wrap="square" rtlCol="1">
+            <a:spAutoFit/>
+          </a:bodyPr>
+          <a:lstStyle/>
+          <a:p>
+            <a:r>
+              <a:rPr lang="he-IL" dirty="0" smtClean="0"/>
+              <a:t>מסעדת דוגמא</a:t>
+            </a:r>
+            <a:endParaRPr lang="he-IL" dirty="0"/>
+          </a:p>
+        </p:txBody>
+      </p:sp>
       <p:grpSp>
         <p:nvGrpSpPr>
           <p:cNvPr id="5" name="Group 4"/>
@@ -4086,7 +4145,7 @@
             <p:nvPr/>
           </p:nvPicPr>
           <p:blipFill>
-            <a:blip r:embed="rId2">
+            <a:blip r:embed="rId3">
               <a:extLst>
                 <a:ext uri="{28A0092B-C50C-407E-A947-70E740481C1C}">
                   <a14:useLocalDpi xmlns:a14="http://schemas.microsoft.com/office/drawing/2010/main" val="0"/>
@@ -4116,7 +4175,7 @@
             <p:nvPr/>
           </p:nvPicPr>
           <p:blipFill>
-            <a:blip r:embed="rId3" cstate="print">
+            <a:blip r:embed="rId4" cstate="print">
               <a:extLst>
                 <a:ext uri="{28A0092B-C50C-407E-A947-70E740481C1C}">
                   <a14:useLocalDpi xmlns:a14="http://schemas.microsoft.com/office/drawing/2010/main" val="0"/>
@@ -4181,7 +4240,7 @@
           <p:nvPr/>
         </p:nvPicPr>
         <p:blipFill>
-          <a:blip r:embed="rId4" cstate="print">
+          <a:blip r:embed="rId5" cstate="print">
             <a:extLst>
               <a:ext uri="{28A0092B-C50C-407E-A947-70E740481C1C}">
                 <a14:useLocalDpi xmlns:a14="http://schemas.microsoft.com/office/drawing/2010/main" val="0"/>
@@ -4428,7 +4487,7 @@
           <p:nvPr/>
         </p:nvPicPr>
         <p:blipFill rotWithShape="1">
-          <a:blip r:embed="rId5">
+          <a:blip r:embed="rId6">
             <a:extLst>
               <a:ext uri="{28A0092B-C50C-407E-A947-70E740481C1C}">
                 <a14:useLocalDpi xmlns:a14="http://schemas.microsoft.com/office/drawing/2010/main" val="0"/>
@@ -4504,7 +4563,7 @@
             <p:nvPr/>
           </p:nvPicPr>
           <p:blipFill>
-            <a:blip r:embed="rId6">
+            <a:blip r:embed="rId7">
               <a:extLst>
                 <a:ext uri="{28A0092B-C50C-407E-A947-70E740481C1C}">
                   <a14:useLocalDpi xmlns:a14="http://schemas.microsoft.com/office/drawing/2010/main" val="0"/>
@@ -4613,7 +4672,7 @@
             <p:nvPr/>
           </p:nvPicPr>
           <p:blipFill>
-            <a:blip r:embed="rId6">
+            <a:blip r:embed="rId7">
               <a:extLst>
                 <a:ext uri="{28A0092B-C50C-407E-A947-70E740481C1C}">
                   <a14:useLocalDpi xmlns:a14="http://schemas.microsoft.com/office/drawing/2010/main" val="0"/>
@@ -4722,7 +4781,7 @@
             <p:nvPr/>
           </p:nvPicPr>
           <p:blipFill rotWithShape="1">
-            <a:blip r:embed="rId5">
+            <a:blip r:embed="rId6">
               <a:extLst>
                 <a:ext uri="{28A0092B-C50C-407E-A947-70E740481C1C}">
                   <a14:useLocalDpi xmlns:a14="http://schemas.microsoft.com/office/drawing/2010/main" val="0"/>
@@ -4798,7 +4857,7 @@
               <p:nvPr/>
             </p:nvPicPr>
             <p:blipFill>
-              <a:blip r:embed="rId6">
+              <a:blip r:embed="rId7">
                 <a:extLst>
                   <a:ext uri="{28A0092B-C50C-407E-A947-70E740481C1C}">
                     <a14:useLocalDpi xmlns:a14="http://schemas.microsoft.com/office/drawing/2010/main" val="0"/>
@@ -4885,35 +4944,6 @@
           </p:sp>
         </p:grpSp>
       </p:grpSp>
-      <p:pic>
-        <p:nvPicPr>
-          <p:cNvPr id="4" name="Content Placeholder 3"/>
-          <p:cNvPicPr>
-            <a:picLocks noChangeAspect="1"/>
-          </p:cNvPicPr>
-          <p:nvPr/>
-        </p:nvPicPr>
-        <p:blipFill rotWithShape="1">
-          <a:blip r:embed="rId7">
-            <a:extLst>
-              <a:ext uri="{28A0092B-C50C-407E-A947-70E740481C1C}">
-                <a14:useLocalDpi xmlns:a14="http://schemas.microsoft.com/office/drawing/2010/main" val="0"/>
-              </a:ext>
-            </a:extLst>
-          </a:blip>
-          <a:srcRect l="22863" t="-234" r="20556" b="2577"/>
-          <a:stretch/>
-        </p:blipFill>
-        <p:spPr>
-          <a:xfrm>
-            <a:off x="395536" y="1653247"/>
-            <a:ext cx="2952328" cy="5139141"/>
-          </a:xfrm>
-          <a:prstGeom prst="rect">
-            <a:avLst/>
-          </a:prstGeom>
-        </p:spPr>
-      </p:pic>
       <p:pic>
         <p:nvPicPr>
           <p:cNvPr id="18" name="Picture 5"/>
@@ -5070,36 +5100,6 @@
           </a:p>
         </p:txBody>
       </p:sp>
-      <p:sp>
-        <p:nvSpPr>
-          <p:cNvPr id="28" name="TextBox 27"/>
-          <p:cNvSpPr txBox="1"/>
-          <p:nvPr/>
-        </p:nvSpPr>
-        <p:spPr>
-          <a:xfrm>
-            <a:off x="1267052" y="2660317"/>
-            <a:ext cx="1384768" cy="369332"/>
-          </a:xfrm>
-          <a:prstGeom prst="rect">
-            <a:avLst/>
-          </a:prstGeom>
-          <a:noFill/>
-        </p:spPr>
-        <p:txBody>
-          <a:bodyPr wrap="square" rtlCol="1">
-            <a:spAutoFit/>
-          </a:bodyPr>
-          <a:lstStyle/>
-          <a:p>
-            <a:r>
-              <a:rPr lang="he-IL" dirty="0" smtClean="0"/>
-              <a:t>מסעדת דוגמא</a:t>
-            </a:r>
-            <a:endParaRPr lang="he-IL" dirty="0"/>
-          </a:p>
-        </p:txBody>
-      </p:sp>
       <p:pic>
         <p:nvPicPr>
           <p:cNvPr id="30" name="Picture 6"/>
@@ -5206,7 +5206,7 @@
         </p:nvSpPr>
         <p:spPr>
           <a:xfrm>
-            <a:off x="539552" y="2420888"/>
+            <a:off x="576892" y="2420888"/>
             <a:ext cx="2664296" cy="3528392"/>
           </a:xfrm>
           <a:prstGeom prst="rect">
@@ -5396,7 +5396,7 @@
             <p:nvPr/>
           </p:nvPicPr>
           <p:blipFill>
-            <a:blip r:embed="rId6">
+            <a:blip r:embed="rId7">
               <a:extLst>
                 <a:ext uri="{28A0092B-C50C-407E-A947-70E740481C1C}">
                   <a14:useLocalDpi xmlns:a14="http://schemas.microsoft.com/office/drawing/2010/main" val="0"/>
@@ -5505,7 +5505,7 @@
             <p:nvPr/>
           </p:nvPicPr>
           <p:blipFill>
-            <a:blip r:embed="rId6">
+            <a:blip r:embed="rId7">
               <a:extLst>
                 <a:ext uri="{28A0092B-C50C-407E-A947-70E740481C1C}">
                   <a14:useLocalDpi xmlns:a14="http://schemas.microsoft.com/office/drawing/2010/main" val="0"/>
@@ -5592,36 +5592,6 @@
           </p:txBody>
         </p:sp>
       </p:grpSp>
-      <p:sp>
-        <p:nvSpPr>
-          <p:cNvPr id="70" name="TextBox 69"/>
-          <p:cNvSpPr txBox="1"/>
-          <p:nvPr/>
-        </p:nvSpPr>
-        <p:spPr>
-          <a:xfrm>
-            <a:off x="1216656" y="2660317"/>
-            <a:ext cx="1384768" cy="369332"/>
-          </a:xfrm>
-          <a:prstGeom prst="rect">
-            <a:avLst/>
-          </a:prstGeom>
-          <a:noFill/>
-        </p:spPr>
-        <p:txBody>
-          <a:bodyPr wrap="square" rtlCol="1">
-            <a:spAutoFit/>
-          </a:bodyPr>
-          <a:lstStyle/>
-          <a:p>
-            <a:r>
-              <a:rPr lang="he-IL" dirty="0" smtClean="0"/>
-              <a:t>מסעדת דוגמא</a:t>
-            </a:r>
-            <a:endParaRPr lang="he-IL" dirty="0"/>
-          </a:p>
-        </p:txBody>
-      </p:sp>
       <p:pic>
         <p:nvPicPr>
           <p:cNvPr id="71" name="Picture 5"/>
@@ -5847,7 +5817,7 @@
                                 </p:cTn>
                               </p:par>
                               <p:par>
-                                <p:cTn id="11" presetID="10" presetClass="exit" presetSubtype="0" fill="hold" grpId="1" nodeType="withEffect">
+                                <p:cTn id="11" presetID="10" presetClass="exit" presetSubtype="0" fill="hold" nodeType="withEffect">
                                   <p:stCondLst>
                                     <p:cond delay="0"/>
                                   </p:stCondLst>
@@ -5856,7 +5826,7 @@
                                       <p:cBhvr>
                                         <p:cTn id="12" dur="500"/>
                                         <p:tgtEl>
-                                          <p:spTgt spid="70"/>
+                                          <p:spTgt spid="71"/>
                                         </p:tgtEl>
                                       </p:cBhvr>
                                     </p:animEffect>
@@ -5868,7 +5838,7 @@
                                           </p:stCondLst>
                                         </p:cTn>
                                         <p:tgtEl>
-                                          <p:spTgt spid="70"/>
+                                          <p:spTgt spid="71"/>
                                         </p:tgtEl>
                                         <p:attrNameLst>
                                           <p:attrName>style.visibility</p:attrName>
@@ -5891,48 +5861,13 @@
                                       <p:cBhvr>
                                         <p:cTn id="15" dur="500"/>
                                         <p:tgtEl>
-                                          <p:spTgt spid="71"/>
+                                          <p:spTgt spid="72"/>
                                         </p:tgtEl>
                                       </p:cBhvr>
                                     </p:animEffect>
                                     <p:set>
                                       <p:cBhvr>
                                         <p:cTn id="16" dur="1" fill="hold">
-                                          <p:stCondLst>
-                                            <p:cond delay="499"/>
-                                          </p:stCondLst>
-                                        </p:cTn>
-                                        <p:tgtEl>
-                                          <p:spTgt spid="71"/>
-                                        </p:tgtEl>
-                                        <p:attrNameLst>
-                                          <p:attrName>style.visibility</p:attrName>
-                                        </p:attrNameLst>
-                                      </p:cBhvr>
-                                      <p:to>
-                                        <p:strVal val="hidden"/>
-                                      </p:to>
-                                    </p:set>
-                                  </p:childTnLst>
-                                </p:cTn>
-                              </p:par>
-                              <p:par>
-                                <p:cTn id="17" presetID="10" presetClass="exit" presetSubtype="0" fill="hold" nodeType="withEffect">
-                                  <p:stCondLst>
-                                    <p:cond delay="0"/>
-                                  </p:stCondLst>
-                                  <p:childTnLst>
-                                    <p:animEffect transition="out" filter="fade">
-                                      <p:cBhvr>
-                                        <p:cTn id="18" dur="500"/>
-                                        <p:tgtEl>
-                                          <p:spTgt spid="72"/>
-                                        </p:tgtEl>
-                                      </p:cBhvr>
-                                    </p:animEffect>
-                                    <p:set>
-                                      <p:cBhvr>
-                                        <p:cTn id="19" dur="1" fill="hold">
                                           <p:stCondLst>
                                             <p:cond delay="499"/>
                                           </p:stCondLst>
@@ -5954,21 +5889,30 @@
                             </p:childTnLst>
                           </p:cTn>
                         </p:par>
+                      </p:childTnLst>
+                    </p:cTn>
+                  </p:par>
+                  <p:par>
+                    <p:cTn id="17" fill="hold">
+                      <p:stCondLst>
+                        <p:cond delay="indefinite"/>
+                      </p:stCondLst>
+                      <p:childTnLst>
                         <p:par>
-                          <p:cTn id="20" fill="hold">
+                          <p:cTn id="18" fill="hold">
                             <p:stCondLst>
-                              <p:cond delay="500"/>
+                              <p:cond delay="0"/>
                             </p:stCondLst>
                             <p:childTnLst>
                               <p:par>
-                                <p:cTn id="21" presetID="32" presetClass="emph" presetSubtype="0" fill="hold" nodeType="afterEffect">
+                                <p:cTn id="19" presetID="32" presetClass="emph" presetSubtype="0" fill="hold" nodeType="clickEffect">
                                   <p:stCondLst>
                                     <p:cond delay="0"/>
                                   </p:stCondLst>
                                   <p:childTnLst>
                                     <p:animRot by="120000">
                                       <p:cBhvr>
-                                        <p:cTn id="22" dur="100" fill="hold">
+                                        <p:cTn id="20" dur="100" fill="hold">
                                           <p:stCondLst>
                                             <p:cond delay="0"/>
                                           </p:stCondLst>
@@ -5983,7 +5927,7 @@
                                     </p:animRot>
                                     <p:animRot by="-240000">
                                       <p:cBhvr>
-                                        <p:cTn id="23" dur="200" fill="hold">
+                                        <p:cTn id="21" dur="200" fill="hold">
                                           <p:stCondLst>
                                             <p:cond delay="200"/>
                                           </p:stCondLst>
@@ -5998,7 +5942,7 @@
                                     </p:animRot>
                                     <p:animRot by="240000">
                                       <p:cBhvr>
-                                        <p:cTn id="24" dur="200" fill="hold">
+                                        <p:cTn id="22" dur="200" fill="hold">
                                           <p:stCondLst>
                                             <p:cond delay="400"/>
                                           </p:stCondLst>
@@ -6013,7 +5957,7 @@
                                     </p:animRot>
                                     <p:animRot by="-240000">
                                       <p:cBhvr>
-                                        <p:cTn id="25" dur="200" fill="hold">
+                                        <p:cTn id="23" dur="200" fill="hold">
                                           <p:stCondLst>
                                             <p:cond delay="600"/>
                                           </p:stCondLst>
@@ -6028,7 +5972,7 @@
                                     </p:animRot>
                                     <p:animRot by="120000">
                                       <p:cBhvr>
-                                        <p:cTn id="26" dur="200" fill="hold">
+                                        <p:cTn id="24" dur="200" fill="hold">
                                           <p:stCondLst>
                                             <p:cond delay="800"/>
                                           </p:stCondLst>
@@ -6048,20 +5992,20 @@
                           </p:cTn>
                         </p:par>
                         <p:par>
-                          <p:cTn id="27" fill="hold">
+                          <p:cTn id="25" fill="hold">
                             <p:stCondLst>
-                              <p:cond delay="1500"/>
+                              <p:cond delay="1000"/>
                             </p:stCondLst>
                             <p:childTnLst>
                               <p:par>
-                                <p:cTn id="28" presetID="10" presetClass="entr" presetSubtype="0" fill="hold" nodeType="afterEffect">
+                                <p:cTn id="26" presetID="10" presetClass="entr" presetSubtype="0" fill="hold" nodeType="afterEffect">
                                   <p:stCondLst>
                                     <p:cond delay="0"/>
                                   </p:stCondLst>
                                   <p:childTnLst>
                                     <p:set>
                                       <p:cBhvr>
-                                        <p:cTn id="29" dur="1" fill="hold">
+                                        <p:cTn id="27" dur="1" fill="hold">
                                           <p:stCondLst>
                                             <p:cond delay="0"/>
                                           </p:stCondLst>
@@ -6079,7 +6023,7 @@
                                     </p:set>
                                     <p:animEffect transition="in" filter="fade">
                                       <p:cBhvr>
-                                        <p:cTn id="30" dur="1000"/>
+                                        <p:cTn id="28" dur="1000"/>
                                         <p:tgtEl>
                                           <p:spTgt spid="54"/>
                                         </p:tgtEl>
@@ -6092,20 +6036,20 @@
                           </p:cTn>
                         </p:par>
                         <p:par>
-                          <p:cTn id="31" fill="hold">
+                          <p:cTn id="29" fill="hold">
                             <p:stCondLst>
-                              <p:cond delay="2500"/>
+                              <p:cond delay="2000"/>
                             </p:stCondLst>
                             <p:childTnLst>
                               <p:par>
-                                <p:cTn id="32" presetID="42" presetClass="entr" presetSubtype="0" fill="hold" nodeType="afterEffect">
+                                <p:cTn id="30" presetID="42" presetClass="entr" presetSubtype="0" fill="hold" nodeType="afterEffect">
                                   <p:stCondLst>
                                     <p:cond delay="750"/>
                                   </p:stCondLst>
                                   <p:childTnLst>
                                     <p:set>
                                       <p:cBhvr>
-                                        <p:cTn id="33" dur="1" fill="hold">
+                                        <p:cTn id="31" dur="1" fill="hold">
                                           <p:stCondLst>
                                             <p:cond delay="0"/>
                                           </p:stCondLst>
@@ -6123,7 +6067,7 @@
                                     </p:set>
                                     <p:animEffect transition="in" filter="fade">
                                       <p:cBhvr>
-                                        <p:cTn id="34" dur="1000"/>
+                                        <p:cTn id="32" dur="1000"/>
                                         <p:tgtEl>
                                           <p:spTgt spid="51"/>
                                         </p:tgtEl>
@@ -6131,7 +6075,7 @@
                                     </p:animEffect>
                                     <p:anim calcmode="lin" valueType="num">
                                       <p:cBhvr>
-                                        <p:cTn id="35" dur="1000" fill="hold"/>
+                                        <p:cTn id="33" dur="1000" fill="hold"/>
                                         <p:tgtEl>
                                           <p:spTgt spid="51"/>
                                         </p:tgtEl>
@@ -6154,7 +6098,7 @@
                                     </p:anim>
                                     <p:anim calcmode="lin" valueType="num">
                                       <p:cBhvr>
-                                        <p:cTn id="36" dur="1000" fill="hold"/>
+                                        <p:cTn id="34" dur="1000" fill="hold"/>
                                         <p:tgtEl>
                                           <p:spTgt spid="51"/>
                                         </p:tgtEl>
@@ -6179,14 +6123,14 @@
                                 </p:cTn>
                               </p:par>
                               <p:par>
-                                <p:cTn id="37" presetID="10" presetClass="entr" presetSubtype="0" fill="hold" grpId="0" nodeType="withEffect">
+                                <p:cTn id="35" presetID="10" presetClass="entr" presetSubtype="0" fill="hold" grpId="0" nodeType="withEffect">
                                   <p:stCondLst>
                                     <p:cond delay="750"/>
                                   </p:stCondLst>
                                   <p:childTnLst>
                                     <p:set>
                                       <p:cBhvr>
-                                        <p:cTn id="38" dur="1" fill="hold">
+                                        <p:cTn id="36" dur="1" fill="hold">
                                           <p:stCondLst>
                                             <p:cond delay="0"/>
                                           </p:stCondLst>
@@ -6204,7 +6148,7 @@
                                     </p:set>
                                     <p:animEffect transition="in" filter="fade">
                                       <p:cBhvr>
-                                        <p:cTn id="39" dur="500"/>
+                                        <p:cTn id="37" dur="500"/>
                                         <p:tgtEl>
                                           <p:spTgt spid="53"/>
                                         </p:tgtEl>
@@ -6242,7 +6186,6 @@
     </p:tnLst>
     <p:bldLst>
       <p:bldP spid="53" grpId="0" animBg="1"/>
-      <p:bldP spid="70" grpId="1"/>
     </p:bldLst>
   </p:timing>
 </p:sld>
@@ -6461,19 +6404,7 @@
               <a:rPr lang="en-US" dirty="0" smtClean="0">
                 <a:hlinkClick r:id="rId2"/>
               </a:rPr>
-              <a:t>http://</a:t>
-            </a:r>
-            <a:r>
-              <a:rPr lang="en-US" dirty="0" smtClean="0">
-                <a:hlinkClick r:id="rId2"/>
-              </a:rPr>
-              <a:t>www.eclipse.org</a:t>
-            </a:r>
-            <a:r>
-              <a:rPr lang="en-US" dirty="0" smtClean="0">
-                <a:hlinkClick r:id="rId2"/>
-              </a:rPr>
-              <a:t>/</a:t>
+              <a:t>http://www.eclipse.org/</a:t>
             </a:r>
             <a:endParaRPr lang="en-US" dirty="0" smtClean="0"/>
           </a:p>
@@ -6965,7 +6896,6 @@
               <a:rPr lang="en-US" dirty="0" smtClean="0"/>
               <a:t>.</a:t>
             </a:r>
-            <a:endParaRPr lang="en-US" dirty="0" smtClean="0"/>
           </a:p>
           <a:p>
             <a:r>

</xml_diff>

<commit_message>
fixed mid sem titles
</commit_message>
<xml_diff>
--- a/food-center/docs/mid_sem.pptx
+++ b/food-center/docs/mid_sem.pptx
@@ -12,8 +12,8 @@
     <p:sldId id="269" r:id="rId3"/>
     <p:sldId id="267" r:id="rId4"/>
     <p:sldId id="266" r:id="rId5"/>
-    <p:sldId id="268" r:id="rId6"/>
-    <p:sldId id="275" r:id="rId7"/>
+    <p:sldId id="275" r:id="rId6"/>
+    <p:sldId id="268" r:id="rId7"/>
     <p:sldId id="270" r:id="rId8"/>
     <p:sldId id="271" r:id="rId9"/>
     <p:sldId id="265" r:id="rId10"/>
@@ -206,7 +206,7 @@
           <a:p>
             <a:fld id="{D9B0BE01-D5BF-4D34-A5B1-06B957001080}" type="datetimeFigureOut">
               <a:rPr lang="he-IL" smtClean="0"/>
-              <a:t>כ"ו/כסלו/תשע"ג</a:t>
+              <a:t>ג'/טבת/תשע"ג</a:t>
             </a:fld>
             <a:endParaRPr lang="he-IL"/>
           </a:p>
@@ -818,7 +818,7 @@
             <a:pPr eaLnBrk="1" latinLnBrk="0" hangingPunct="1"/>
             <a:fld id="{DF030894-FDF1-49AF-8058-4C55B35AF967}" type="datetime1">
               <a:rPr lang="en-US" smtClean="0"/>
-              <a:t>12/10/2012</a:t>
+              <a:t>12/16/2012</a:t>
             </a:fld>
             <a:endParaRPr lang="en-US"/>
           </a:p>
@@ -968,7 +968,7 @@
             <a:pPr eaLnBrk="1" latinLnBrk="0" hangingPunct="1"/>
             <a:fld id="{1C69CC89-E9F8-4835-8AA8-7B4688FD7922}" type="datetime1">
               <a:rPr lang="en-US" smtClean="0"/>
-              <a:t>12/10/2012</a:t>
+              <a:t>12/16/2012</a:t>
             </a:fld>
             <a:endParaRPr lang="en-US"/>
           </a:p>
@@ -1145,7 +1145,7 @@
             <a:pPr eaLnBrk="1" latinLnBrk="0" hangingPunct="1"/>
             <a:fld id="{9FB13C8F-7327-4072-B74E-5AB672FAA917}" type="datetime1">
               <a:rPr lang="en-US" smtClean="0"/>
-              <a:t>12/10/2012</a:t>
+              <a:t>12/16/2012</a:t>
             </a:fld>
             <a:endParaRPr lang="en-US"/>
           </a:p>
@@ -1328,7 +1328,7 @@
             <a:pPr eaLnBrk="1" latinLnBrk="0" hangingPunct="1"/>
             <a:fld id="{F6DB66CA-DB78-4911-87A4-76C50FE88C79}" type="datetime1">
               <a:rPr lang="en-US" smtClean="0"/>
-              <a:t>12/10/2012</a:t>
+              <a:t>12/16/2012</a:t>
             </a:fld>
             <a:endParaRPr lang="en-US"/>
           </a:p>
@@ -1570,7 +1570,7 @@
             <a:pPr eaLnBrk="1" latinLnBrk="0" hangingPunct="1"/>
             <a:fld id="{EE53196A-85F1-41ED-B452-8CA5D27E152D}" type="datetime1">
               <a:rPr lang="en-US" smtClean="0"/>
-              <a:t>12/10/2012</a:t>
+              <a:t>12/16/2012</a:t>
             </a:fld>
             <a:endParaRPr lang="en-US"/>
           </a:p>
@@ -1868,7 +1868,7 @@
             <a:pPr eaLnBrk="1" latinLnBrk="0" hangingPunct="1"/>
             <a:fld id="{79BA271D-E08A-4171-B117-65FB134BE1D8}" type="datetime1">
               <a:rPr lang="en-US" smtClean="0"/>
-              <a:t>12/10/2012</a:t>
+              <a:t>12/16/2012</a:t>
             </a:fld>
             <a:endParaRPr lang="en-US"/>
           </a:p>
@@ -2254,7 +2254,7 @@
             <a:pPr eaLnBrk="1" latinLnBrk="0" hangingPunct="1"/>
             <a:fld id="{69AB665B-3DBD-4426-BA43-87FCF0529618}" type="datetime1">
               <a:rPr lang="en-US" smtClean="0"/>
-              <a:t>12/10/2012</a:t>
+              <a:t>12/16/2012</a:t>
             </a:fld>
             <a:endParaRPr lang="en-US"/>
           </a:p>
@@ -2429,7 +2429,7 @@
             <a:pPr eaLnBrk="1" latinLnBrk="0" hangingPunct="1"/>
             <a:fld id="{1DE19FB1-A3B4-4E8C-88F2-DB29773F5936}" type="datetime1">
               <a:rPr lang="en-US" smtClean="0"/>
-              <a:t>12/10/2012</a:t>
+              <a:t>12/16/2012</a:t>
             </a:fld>
             <a:endParaRPr lang="en-US"/>
           </a:p>
@@ -2521,7 +2521,7 @@
             <a:pPr eaLnBrk="1" latinLnBrk="0" hangingPunct="1"/>
             <a:fld id="{CE580D32-CFE7-4479-880D-8DC22CFC80B6}" type="datetime1">
               <a:rPr lang="en-US" smtClean="0"/>
-              <a:t>12/10/2012</a:t>
+              <a:t>12/16/2012</a:t>
             </a:fld>
             <a:endParaRPr lang="en-US"/>
           </a:p>
@@ -2818,7 +2818,7 @@
             <a:pPr eaLnBrk="1" latinLnBrk="0" hangingPunct="1"/>
             <a:fld id="{2384A284-52FE-4810-8277-CC75EC1C1622}" type="datetime1">
               <a:rPr lang="en-US" smtClean="0"/>
-              <a:t>12/10/2012</a:t>
+              <a:t>12/16/2012</a:t>
             </a:fld>
             <a:endParaRPr lang="en-US"/>
           </a:p>
@@ -2954,7 +2954,7 @@
             <a:pPr eaLnBrk="1" latinLnBrk="0" hangingPunct="1"/>
             <a:fld id="{9FD48A97-779D-49F9-88B9-1B72A67BF81B}" type="datetime1">
               <a:rPr lang="en-US" smtClean="0"/>
-              <a:t>12/10/2012</a:t>
+              <a:t>12/16/2012</a:t>
             </a:fld>
             <a:endParaRPr lang="en-US"/>
           </a:p>
@@ -3259,7 +3259,7 @@
             <a:pPr algn="l" eaLnBrk="1" latinLnBrk="0" hangingPunct="1"/>
             <a:fld id="{839E7CE6-A2D5-41DF-8449-C89B850264C5}" type="datetime1">
               <a:rPr lang="en-US" smtClean="0"/>
-              <a:t>12/10/2012</a:t>
+              <a:t>12/16/2012</a:t>
             </a:fld>
             <a:endParaRPr lang="en-US" dirty="0">
               <a:solidFill>
@@ -9121,11 +9121,7 @@
               <a:pPr algn="ctr"/>
               <a:r>
                 <a:rPr lang="en-US" sz="1200" dirty="0" smtClean="0"/>
-                <a:t>M</a:t>
-              </a:r>
-              <a:r>
-                <a:rPr lang="en-US" sz="1200" dirty="0" smtClean="0"/>
-                <a:t>enu</a:t>
+                <a:t>Menu</a:t>
               </a:r>
               <a:endParaRPr lang="he-IL" sz="1100" dirty="0"/>
             </a:p>
@@ -14090,16 +14086,20 @@
           <a:lstStyle/>
           <a:p>
             <a:r>
+              <a:rPr lang="en-US" dirty="0"/>
+              <a:t>Google APP </a:t>
+            </a:r>
+            <a:r>
+              <a:rPr lang="en-US" dirty="0" err="1"/>
+              <a:t>EnginE</a:t>
+            </a:r>
+            <a:r>
+              <a:rPr lang="en-US" dirty="0"/>
+              <a:t> (HOW</a:t>
+            </a:r>
+            <a:r>
               <a:rPr lang="en-US" dirty="0" smtClean="0"/>
-              <a:t>Google APP </a:t>
-            </a:r>
-            <a:r>
-              <a:rPr lang="en-US" dirty="0" err="1" smtClean="0"/>
-              <a:t>EnginE</a:t>
-            </a:r>
-            <a:r>
-              <a:rPr lang="en-US" dirty="0" smtClean="0"/>
-              <a:t> (HOW)</a:t>
+              <a:t>)</a:t>
             </a:r>
             <a:endParaRPr lang="he-IL" dirty="0"/>
           </a:p>
@@ -14118,27 +14118,15 @@
         <p:spPr/>
         <p:txBody>
           <a:bodyPr>
-            <a:normAutofit/>
+            <a:normAutofit lnSpcReduction="10000"/>
           </a:bodyPr>
           <a:lstStyle/>
           <a:p>
             <a:pPr algn="l" rtl="0"/>
             <a:r>
               <a:rPr lang="en-US" dirty="0" smtClean="0"/>
-              <a:t>Free </a:t>
-            </a:r>
-            <a:r>
-              <a:rPr lang="en-US" dirty="0" smtClean="0"/>
-              <a:t>Data Base</a:t>
-            </a:r>
-            <a:r>
-              <a:rPr lang="en-US" dirty="0" smtClean="0"/>
-              <a:t>.</a:t>
-            </a:r>
-          </a:p>
-          <a:p>
-            <a:pPr algn="l" rtl="0"/>
-            <a:endParaRPr lang="en-US" dirty="0" smtClean="0"/>
+              <a:t>Free JAVA servlet container.</a:t>
+            </a:r>
           </a:p>
           <a:p>
             <a:pPr algn="l" rtl="0"/>
@@ -14151,41 +14139,61 @@
             <a:pPr lvl="1" algn="l" rtl="0"/>
             <a:r>
               <a:rPr lang="en-US" dirty="0" smtClean="0"/>
-              <a:t>Native java driver</a:t>
+              <a:t>Eclipse plugin.</a:t>
             </a:r>
           </a:p>
           <a:p>
             <a:pPr lvl="1" algn="l" rtl="0"/>
             <a:r>
               <a:rPr lang="en-US" dirty="0" smtClean="0"/>
-              <a:t>JDO implementation</a:t>
+              <a:t>Big web community.</a:t>
             </a:r>
           </a:p>
           <a:p>
             <a:pPr lvl="1" algn="l" rtl="0"/>
             <a:r>
               <a:rPr lang="en-US" dirty="0" smtClean="0"/>
-              <a:t>JPA implementation</a:t>
+              <a:t>Easy to access Admin panel.</a:t>
+            </a:r>
+          </a:p>
+          <a:p>
+            <a:pPr algn="l" rtl="0"/>
+            <a:r>
+              <a:rPr lang="en-US" dirty="0" smtClean="0"/>
+              <a:t>Easy integration with other </a:t>
+            </a:r>
+            <a:r>
+              <a:rPr lang="en-US" dirty="0"/>
+              <a:t>G</a:t>
+            </a:r>
+            <a:r>
+              <a:rPr lang="en-US" dirty="0" smtClean="0"/>
+              <a:t>oogle services.</a:t>
             </a:r>
           </a:p>
           <a:p>
             <a:pPr lvl="1" algn="l" rtl="0"/>
-            <a:endParaRPr lang="en-US" dirty="0" smtClean="0"/>
+            <a:r>
+              <a:rPr lang="en-US" dirty="0" smtClean="0"/>
+              <a:t>Google Data store.</a:t>
+            </a:r>
+          </a:p>
+          <a:p>
+            <a:pPr lvl="1" algn="l" rtl="0"/>
+            <a:r>
+              <a:rPr lang="en-US" dirty="0" smtClean="0"/>
+              <a:t>Google user verification.</a:t>
+            </a:r>
+          </a:p>
+          <a:p>
+            <a:pPr lvl="1" algn="l" rtl="0"/>
+            <a:r>
+              <a:rPr lang="en-US" dirty="0" smtClean="0"/>
+              <a:t>Google Cloud Messaging</a:t>
+            </a:r>
           </a:p>
           <a:p>
             <a:pPr algn="l" rtl="0"/>
-            <a:r>
-              <a:rPr lang="en-US" dirty="0" smtClean="0"/>
-              <a:t>Easy </a:t>
-            </a:r>
-            <a:r>
-              <a:rPr lang="en-US" dirty="0" smtClean="0"/>
-              <a:t>integration with </a:t>
-            </a:r>
-            <a:r>
-              <a:rPr lang="en-US" dirty="0" smtClean="0"/>
-              <a:t>Google App engine.</a:t>
-            </a:r>
             <a:endParaRPr lang="en-US" dirty="0" smtClean="0"/>
           </a:p>
           <a:p>
@@ -14220,7 +14228,7 @@
     </p:spTree>
     <p:extLst>
       <p:ext uri="{BB962C8B-B14F-4D97-AF65-F5344CB8AC3E}">
-        <p14:creationId xmlns:p14="http://schemas.microsoft.com/office/powerpoint/2010/main" val="4179021381"/>
+        <p14:creationId xmlns:p14="http://schemas.microsoft.com/office/powerpoint/2010/main" val="2341650973"/>
       </p:ext>
     </p:extLst>
   </p:cSld>
@@ -14272,16 +14280,8 @@
           <a:lstStyle/>
           <a:p>
             <a:r>
-              <a:rPr lang="en-US" dirty="0" smtClean="0"/>
-              <a:t>Google </a:t>
-            </a:r>
-            <a:r>
-              <a:rPr lang="en-US" dirty="0" smtClean="0"/>
-              <a:t>Data store (HOW</a:t>
-            </a:r>
-            <a:r>
-              <a:rPr lang="en-US" dirty="0" smtClean="0"/>
-              <a:t>)</a:t>
+              <a:rPr lang="en-US" dirty="0"/>
+              <a:t>Google Data store (HOW)</a:t>
             </a:r>
             <a:endParaRPr lang="he-IL" dirty="0"/>
           </a:p>
@@ -14300,15 +14300,19 @@
         <p:spPr/>
         <p:txBody>
           <a:bodyPr>
-            <a:normAutofit lnSpcReduction="10000"/>
+            <a:normAutofit/>
           </a:bodyPr>
           <a:lstStyle/>
           <a:p>
             <a:pPr algn="l" rtl="0"/>
             <a:r>
               <a:rPr lang="en-US" dirty="0" smtClean="0"/>
-              <a:t>Free JAVA servlet container.</a:t>
-            </a:r>
+              <a:t>Free Data Base.</a:t>
+            </a:r>
+          </a:p>
+          <a:p>
+            <a:pPr algn="l" rtl="0"/>
+            <a:endParaRPr lang="en-US" dirty="0" smtClean="0"/>
           </a:p>
           <a:p>
             <a:pPr algn="l" rtl="0"/>
@@ -14321,62 +14325,33 @@
             <a:pPr lvl="1" algn="l" rtl="0"/>
             <a:r>
               <a:rPr lang="en-US" dirty="0" smtClean="0"/>
-              <a:t>Eclipse plugin.</a:t>
+              <a:t>Native java driver</a:t>
             </a:r>
           </a:p>
           <a:p>
             <a:pPr lvl="1" algn="l" rtl="0"/>
             <a:r>
               <a:rPr lang="en-US" dirty="0" smtClean="0"/>
-              <a:t>Big web community.</a:t>
+              <a:t>JDO implementation</a:t>
             </a:r>
           </a:p>
           <a:p>
             <a:pPr lvl="1" algn="l" rtl="0"/>
             <a:r>
               <a:rPr lang="en-US" dirty="0" smtClean="0"/>
-              <a:t>Easy to access Admin panel.</a:t>
-            </a:r>
+              <a:t>JPA implementation</a:t>
+            </a:r>
+          </a:p>
+          <a:p>
+            <a:pPr lvl="1" algn="l" rtl="0"/>
+            <a:endParaRPr lang="en-US" dirty="0" smtClean="0"/>
           </a:p>
           <a:p>
             <a:pPr algn="l" rtl="0"/>
             <a:r>
               <a:rPr lang="en-US" dirty="0" smtClean="0"/>
-              <a:t>Easy integration with other </a:t>
-            </a:r>
-            <a:r>
-              <a:rPr lang="en-US" dirty="0"/>
-              <a:t>G</a:t>
-            </a:r>
-            <a:r>
-              <a:rPr lang="en-US" dirty="0" smtClean="0"/>
-              <a:t>oogle services.</a:t>
-            </a:r>
-          </a:p>
-          <a:p>
-            <a:pPr lvl="1" algn="l" rtl="0"/>
-            <a:r>
-              <a:rPr lang="en-US" dirty="0" smtClean="0"/>
-              <a:t>Google Data store.</a:t>
-            </a:r>
-          </a:p>
-          <a:p>
-            <a:pPr lvl="1" algn="l" rtl="0"/>
-            <a:r>
-              <a:rPr lang="en-US" dirty="0" smtClean="0"/>
-              <a:t>Google user verification.</a:t>
-            </a:r>
-          </a:p>
-          <a:p>
-            <a:pPr lvl="1" algn="l" rtl="0"/>
-            <a:r>
-              <a:rPr lang="en-US" dirty="0" smtClean="0"/>
-              <a:t>Google Cloud Messaging</a:t>
-            </a:r>
-          </a:p>
-          <a:p>
-            <a:pPr algn="l" rtl="0"/>
-            <a:endParaRPr lang="en-US" dirty="0" smtClean="0"/>
+              <a:t>Easy integration with Google App engine.</a:t>
+            </a:r>
           </a:p>
           <a:p>
             <a:pPr algn="l" rtl="0"/>
@@ -14410,7 +14385,7 @@
     </p:spTree>
     <p:extLst>
       <p:ext uri="{BB962C8B-B14F-4D97-AF65-F5344CB8AC3E}">
-        <p14:creationId xmlns:p14="http://schemas.microsoft.com/office/powerpoint/2010/main" val="2341650973"/>
+        <p14:creationId xmlns:p14="http://schemas.microsoft.com/office/powerpoint/2010/main" val="4179021381"/>
       </p:ext>
     </p:extLst>
   </p:cSld>

</xml_diff>

<commit_message>
added high level class diagram to presentation.
</commit_message>
<xml_diff>
--- a/food-center/docs/mid_sem.pptx
+++ b/food-center/docs/mid_sem.pptx
@@ -5,7 +5,7 @@
     <p:sldMasterId id="2147483660" r:id="rId1"/>
   </p:sldMasterIdLst>
   <p:notesMasterIdLst>
-    <p:notesMasterId r:id="rId17"/>
+    <p:notesMasterId r:id="rId20"/>
   </p:notesMasterIdLst>
   <p:sldIdLst>
     <p:sldId id="256" r:id="rId2"/>
@@ -17,12 +17,15 @@
     <p:sldId id="270" r:id="rId8"/>
     <p:sldId id="271" r:id="rId9"/>
     <p:sldId id="265" r:id="rId10"/>
-    <p:sldId id="258" r:id="rId11"/>
-    <p:sldId id="273" r:id="rId12"/>
-    <p:sldId id="274" r:id="rId13"/>
-    <p:sldId id="261" r:id="rId14"/>
-    <p:sldId id="257" r:id="rId15"/>
-    <p:sldId id="272" r:id="rId16"/>
+    <p:sldId id="276" r:id="rId11"/>
+    <p:sldId id="277" r:id="rId12"/>
+    <p:sldId id="278" r:id="rId13"/>
+    <p:sldId id="258" r:id="rId14"/>
+    <p:sldId id="273" r:id="rId15"/>
+    <p:sldId id="274" r:id="rId16"/>
+    <p:sldId id="261" r:id="rId17"/>
+    <p:sldId id="257" r:id="rId18"/>
+    <p:sldId id="272" r:id="rId19"/>
   </p:sldIdLst>
   <p:sldSz cx="9144000" cy="6858000" type="screen4x3"/>
   <p:notesSz cx="6858000" cy="9144000"/>
@@ -623,7 +626,7 @@
           <a:p>
             <a:fld id="{0C8F25D5-F4F7-4B33-847F-6FA75A957AFF}" type="slidenum">
               <a:rPr lang="he-IL" smtClean="0"/>
-              <a:t>14</a:t>
+              <a:t>17</a:t>
             </a:fld>
             <a:endParaRPr lang="he-IL"/>
           </a:p>
@@ -4050,6 +4053,445 @@
 </file>
 
 <file path=ppt/slides/slide10.xml><?xml version="1.0" encoding="utf-8"?>
+<p:sld xmlns:a="http://schemas.openxmlformats.org/drawingml/2006/main" xmlns:r="http://schemas.openxmlformats.org/officeDocument/2006/relationships" xmlns:p="http://schemas.openxmlformats.org/presentationml/2006/main">
+  <p:cSld>
+    <p:spTree>
+      <p:nvGrpSpPr>
+        <p:cNvPr id="1" name=""/>
+        <p:cNvGrpSpPr/>
+        <p:nvPr/>
+      </p:nvGrpSpPr>
+      <p:grpSpPr>
+        <a:xfrm>
+          <a:off x="0" y="0"/>
+          <a:ext cx="0" cy="0"/>
+          <a:chOff x="0" y="0"/>
+          <a:chExt cx="0" cy="0"/>
+        </a:xfrm>
+      </p:grpSpPr>
+      <p:sp>
+        <p:nvSpPr>
+          <p:cNvPr id="2" name="Title 1"/>
+          <p:cNvSpPr>
+            <a:spLocks noGrp="1"/>
+          </p:cNvSpPr>
+          <p:nvPr>
+            <p:ph type="title"/>
+          </p:nvPr>
+        </p:nvSpPr>
+        <p:spPr/>
+        <p:txBody>
+          <a:bodyPr/>
+          <a:lstStyle/>
+          <a:p>
+            <a:r>
+              <a:rPr lang="en-US" dirty="0" smtClean="0"/>
+              <a:t>High level </a:t>
+            </a:r>
+            <a:r>
+              <a:rPr lang="en-US" dirty="0" err="1" smtClean="0"/>
+              <a:t>db</a:t>
+            </a:r>
+            <a:r>
+              <a:rPr lang="en-US" dirty="0" smtClean="0"/>
+              <a:t> class diagram (HOW)</a:t>
+            </a:r>
+            <a:endParaRPr lang="he-IL" dirty="0"/>
+          </a:p>
+        </p:txBody>
+      </p:sp>
+      <p:sp>
+        <p:nvSpPr>
+          <p:cNvPr id="3" name="Content Placeholder 2"/>
+          <p:cNvSpPr>
+            <a:spLocks noGrp="1"/>
+          </p:cNvSpPr>
+          <p:nvPr>
+            <p:ph idx="1"/>
+          </p:nvPr>
+        </p:nvSpPr>
+        <p:spPr/>
+        <p:txBody>
+          <a:bodyPr/>
+          <a:lstStyle/>
+          <a:p>
+            <a:endParaRPr lang="he-IL"/>
+          </a:p>
+        </p:txBody>
+      </p:sp>
+      <p:sp>
+        <p:nvSpPr>
+          <p:cNvPr id="4" name="Slide Number Placeholder 3"/>
+          <p:cNvSpPr>
+            <a:spLocks noGrp="1"/>
+          </p:cNvSpPr>
+          <p:nvPr>
+            <p:ph type="sldNum" sz="quarter" idx="12"/>
+          </p:nvPr>
+        </p:nvSpPr>
+        <p:spPr/>
+        <p:txBody>
+          <a:bodyPr/>
+          <a:lstStyle/>
+          <a:p>
+            <a:fld id="{DF7E9A30-B352-493C-9BED-B66D9B0B1F1E}" type="slidenum">
+              <a:rPr lang="en-US" smtClean="0"/>
+              <a:t>10</a:t>
+            </a:fld>
+            <a:endParaRPr lang="en-US" dirty="0"/>
+          </a:p>
+        </p:txBody>
+      </p:sp>
+      <p:pic>
+        <p:nvPicPr>
+          <p:cNvPr id="1026" name="Picture 2" descr="C:\workspace\food-center\food-center\docs\hilevel_db.png"/>
+          <p:cNvPicPr>
+            <a:picLocks noChangeAspect="1" noChangeArrowheads="1"/>
+          </p:cNvPicPr>
+          <p:nvPr/>
+        </p:nvPicPr>
+        <p:blipFill>
+          <a:blip r:embed="rId2">
+            <a:extLst>
+              <a:ext uri="{28A0092B-C50C-407E-A947-70E740481C1C}">
+                <a14:useLocalDpi xmlns:a14="http://schemas.microsoft.com/office/drawing/2010/main" val="0"/>
+              </a:ext>
+            </a:extLst>
+          </a:blip>
+          <a:srcRect/>
+          <a:stretch>
+            <a:fillRect/>
+          </a:stretch>
+        </p:blipFill>
+        <p:spPr bwMode="auto">
+          <a:xfrm>
+            <a:off x="971600" y="1567459"/>
+            <a:ext cx="7272808" cy="4556729"/>
+          </a:xfrm>
+          <a:prstGeom prst="rect">
+            <a:avLst/>
+          </a:prstGeom>
+          <a:noFill/>
+          <a:extLst>
+            <a:ext uri="{909E8E84-426E-40DD-AFC4-6F175D3DCCD1}">
+              <a14:hiddenFill xmlns:a14="http://schemas.microsoft.com/office/drawing/2010/main">
+                <a:solidFill>
+                  <a:srgbClr val="FFFFFF"/>
+                </a:solidFill>
+              </a14:hiddenFill>
+            </a:ext>
+          </a:extLst>
+        </p:spPr>
+      </p:pic>
+    </p:spTree>
+    <p:extLst>
+      <p:ext uri="{BB962C8B-B14F-4D97-AF65-F5344CB8AC3E}">
+        <p14:creationId xmlns:p14="http://schemas.microsoft.com/office/powerpoint/2010/main" val="1369809598"/>
+      </p:ext>
+    </p:extLst>
+  </p:cSld>
+  <p:clrMapOvr>
+    <a:masterClrMapping/>
+  </p:clrMapOvr>
+  <p:timing>
+    <p:tnLst>
+      <p:par>
+        <p:cTn id="1" dur="indefinite" restart="never" nodeType="tmRoot"/>
+      </p:par>
+    </p:tnLst>
+  </p:timing>
+</p:sld>
+</file>
+
+<file path=ppt/slides/slide11.xml><?xml version="1.0" encoding="utf-8"?>
+<p:sld xmlns:a="http://schemas.openxmlformats.org/drawingml/2006/main" xmlns:r="http://schemas.openxmlformats.org/officeDocument/2006/relationships" xmlns:p="http://schemas.openxmlformats.org/presentationml/2006/main">
+  <p:cSld>
+    <p:spTree>
+      <p:nvGrpSpPr>
+        <p:cNvPr id="1" name=""/>
+        <p:cNvGrpSpPr/>
+        <p:nvPr/>
+      </p:nvGrpSpPr>
+      <p:grpSpPr>
+        <a:xfrm>
+          <a:off x="0" y="0"/>
+          <a:ext cx="0" cy="0"/>
+          <a:chOff x="0" y="0"/>
+          <a:chExt cx="0" cy="0"/>
+        </a:xfrm>
+      </p:grpSpPr>
+      <p:sp>
+        <p:nvSpPr>
+          <p:cNvPr id="2" name="Title 1"/>
+          <p:cNvSpPr>
+            <a:spLocks noGrp="1"/>
+          </p:cNvSpPr>
+          <p:nvPr>
+            <p:ph type="title"/>
+          </p:nvPr>
+        </p:nvSpPr>
+        <p:spPr/>
+        <p:txBody>
+          <a:bodyPr>
+            <a:normAutofit fontScale="90000"/>
+          </a:bodyPr>
+          <a:lstStyle/>
+          <a:p>
+            <a:r>
+              <a:rPr lang="en-US" dirty="0" smtClean="0"/>
+              <a:t>HIGH level android class diagram(how)</a:t>
+            </a:r>
+            <a:endParaRPr lang="he-IL" dirty="0"/>
+          </a:p>
+        </p:txBody>
+      </p:sp>
+      <p:sp>
+        <p:nvSpPr>
+          <p:cNvPr id="3" name="Content Placeholder 2"/>
+          <p:cNvSpPr>
+            <a:spLocks noGrp="1"/>
+          </p:cNvSpPr>
+          <p:nvPr>
+            <p:ph idx="1"/>
+          </p:nvPr>
+        </p:nvSpPr>
+        <p:spPr/>
+        <p:txBody>
+          <a:bodyPr/>
+          <a:lstStyle/>
+          <a:p>
+            <a:endParaRPr lang="he-IL"/>
+          </a:p>
+        </p:txBody>
+      </p:sp>
+      <p:sp>
+        <p:nvSpPr>
+          <p:cNvPr id="4" name="Slide Number Placeholder 3"/>
+          <p:cNvSpPr>
+            <a:spLocks noGrp="1"/>
+          </p:cNvSpPr>
+          <p:nvPr>
+            <p:ph type="sldNum" sz="quarter" idx="12"/>
+          </p:nvPr>
+        </p:nvSpPr>
+        <p:spPr/>
+        <p:txBody>
+          <a:bodyPr/>
+          <a:lstStyle/>
+          <a:p>
+            <a:fld id="{DF7E9A30-B352-493C-9BED-B66D9B0B1F1E}" type="slidenum">
+              <a:rPr lang="en-US" smtClean="0"/>
+              <a:t>11</a:t>
+            </a:fld>
+            <a:endParaRPr lang="en-US" dirty="0"/>
+          </a:p>
+        </p:txBody>
+      </p:sp>
+      <p:pic>
+        <p:nvPicPr>
+          <p:cNvPr id="2050" name="Picture 2" descr="C:\workspace\food-center\food-center\docs\hilevel_android.png"/>
+          <p:cNvPicPr>
+            <a:picLocks noChangeAspect="1" noChangeArrowheads="1"/>
+          </p:cNvPicPr>
+          <p:nvPr/>
+        </p:nvPicPr>
+        <p:blipFill>
+          <a:blip r:embed="rId2">
+            <a:extLst>
+              <a:ext uri="{28A0092B-C50C-407E-A947-70E740481C1C}">
+                <a14:useLocalDpi xmlns:a14="http://schemas.microsoft.com/office/drawing/2010/main" val="0"/>
+              </a:ext>
+            </a:extLst>
+          </a:blip>
+          <a:srcRect/>
+          <a:stretch>
+            <a:fillRect/>
+          </a:stretch>
+        </p:blipFill>
+        <p:spPr bwMode="auto">
+          <a:xfrm>
+            <a:off x="467544" y="1340768"/>
+            <a:ext cx="7942634" cy="5254682"/>
+          </a:xfrm>
+          <a:prstGeom prst="rect">
+            <a:avLst/>
+          </a:prstGeom>
+          <a:noFill/>
+          <a:extLst>
+            <a:ext uri="{909E8E84-426E-40DD-AFC4-6F175D3DCCD1}">
+              <a14:hiddenFill xmlns:a14="http://schemas.microsoft.com/office/drawing/2010/main">
+                <a:solidFill>
+                  <a:srgbClr val="FFFFFF"/>
+                </a:solidFill>
+              </a14:hiddenFill>
+            </a:ext>
+          </a:extLst>
+        </p:spPr>
+      </p:pic>
+    </p:spTree>
+    <p:extLst>
+      <p:ext uri="{BB962C8B-B14F-4D97-AF65-F5344CB8AC3E}">
+        <p14:creationId xmlns:p14="http://schemas.microsoft.com/office/powerpoint/2010/main" val="754311153"/>
+      </p:ext>
+    </p:extLst>
+  </p:cSld>
+  <p:clrMapOvr>
+    <a:masterClrMapping/>
+  </p:clrMapOvr>
+  <p:timing>
+    <p:tnLst>
+      <p:par>
+        <p:cTn id="1" dur="indefinite" restart="never" nodeType="tmRoot"/>
+      </p:par>
+    </p:tnLst>
+  </p:timing>
+</p:sld>
+</file>
+
+<file path=ppt/slides/slide12.xml><?xml version="1.0" encoding="utf-8"?>
+<p:sld xmlns:a="http://schemas.openxmlformats.org/drawingml/2006/main" xmlns:r="http://schemas.openxmlformats.org/officeDocument/2006/relationships" xmlns:p="http://schemas.openxmlformats.org/presentationml/2006/main">
+  <p:cSld>
+    <p:spTree>
+      <p:nvGrpSpPr>
+        <p:cNvPr id="1" name=""/>
+        <p:cNvGrpSpPr/>
+        <p:nvPr/>
+      </p:nvGrpSpPr>
+      <p:grpSpPr>
+        <a:xfrm>
+          <a:off x="0" y="0"/>
+          <a:ext cx="0" cy="0"/>
+          <a:chOff x="0" y="0"/>
+          <a:chExt cx="0" cy="0"/>
+        </a:xfrm>
+      </p:grpSpPr>
+      <p:sp>
+        <p:nvSpPr>
+          <p:cNvPr id="2" name="Title 1"/>
+          <p:cNvSpPr>
+            <a:spLocks noGrp="1"/>
+          </p:cNvSpPr>
+          <p:nvPr>
+            <p:ph type="title"/>
+          </p:nvPr>
+        </p:nvSpPr>
+        <p:spPr/>
+        <p:txBody>
+          <a:bodyPr/>
+          <a:lstStyle/>
+          <a:p>
+            <a:r>
+              <a:rPr lang="en-US" dirty="0" smtClean="0"/>
+              <a:t>High level web class diagram (HOW)</a:t>
+            </a:r>
+            <a:endParaRPr lang="he-IL" dirty="0"/>
+          </a:p>
+        </p:txBody>
+      </p:sp>
+      <p:sp>
+        <p:nvSpPr>
+          <p:cNvPr id="3" name="Content Placeholder 2"/>
+          <p:cNvSpPr>
+            <a:spLocks noGrp="1"/>
+          </p:cNvSpPr>
+          <p:nvPr>
+            <p:ph idx="1"/>
+          </p:nvPr>
+        </p:nvSpPr>
+        <p:spPr/>
+        <p:txBody>
+          <a:bodyPr/>
+          <a:lstStyle/>
+          <a:p>
+            <a:endParaRPr lang="he-IL"/>
+          </a:p>
+        </p:txBody>
+      </p:sp>
+      <p:sp>
+        <p:nvSpPr>
+          <p:cNvPr id="4" name="Slide Number Placeholder 3"/>
+          <p:cNvSpPr>
+            <a:spLocks noGrp="1"/>
+          </p:cNvSpPr>
+          <p:nvPr>
+            <p:ph type="sldNum" sz="quarter" idx="12"/>
+          </p:nvPr>
+        </p:nvSpPr>
+        <p:spPr/>
+        <p:txBody>
+          <a:bodyPr/>
+          <a:lstStyle/>
+          <a:p>
+            <a:fld id="{DF7E9A30-B352-493C-9BED-B66D9B0B1F1E}" type="slidenum">
+              <a:rPr lang="en-US" smtClean="0"/>
+              <a:t>12</a:t>
+            </a:fld>
+            <a:endParaRPr lang="en-US" dirty="0"/>
+          </a:p>
+        </p:txBody>
+      </p:sp>
+      <p:pic>
+        <p:nvPicPr>
+          <p:cNvPr id="3074" name="Picture 2" descr="C:\workspace\food-center\food-center\docs\hilevel_web.png"/>
+          <p:cNvPicPr>
+            <a:picLocks noChangeAspect="1" noChangeArrowheads="1"/>
+          </p:cNvPicPr>
+          <p:nvPr/>
+        </p:nvPicPr>
+        <p:blipFill>
+          <a:blip r:embed="rId2">
+            <a:extLst>
+              <a:ext uri="{28A0092B-C50C-407E-A947-70E740481C1C}">
+                <a14:useLocalDpi xmlns:a14="http://schemas.microsoft.com/office/drawing/2010/main" val="0"/>
+              </a:ext>
+            </a:extLst>
+          </a:blip>
+          <a:srcRect/>
+          <a:stretch>
+            <a:fillRect/>
+          </a:stretch>
+        </p:blipFill>
+        <p:spPr bwMode="auto">
+          <a:xfrm>
+            <a:off x="251520" y="1628800"/>
+            <a:ext cx="8721929" cy="4281860"/>
+          </a:xfrm>
+          <a:prstGeom prst="rect">
+            <a:avLst/>
+          </a:prstGeom>
+          <a:noFill/>
+          <a:extLst>
+            <a:ext uri="{909E8E84-426E-40DD-AFC4-6F175D3DCCD1}">
+              <a14:hiddenFill xmlns:a14="http://schemas.microsoft.com/office/drawing/2010/main">
+                <a:solidFill>
+                  <a:srgbClr val="FFFFFF"/>
+                </a:solidFill>
+              </a14:hiddenFill>
+            </a:ext>
+          </a:extLst>
+        </p:spPr>
+      </p:pic>
+    </p:spTree>
+    <p:extLst>
+      <p:ext uri="{BB962C8B-B14F-4D97-AF65-F5344CB8AC3E}">
+        <p14:creationId xmlns:p14="http://schemas.microsoft.com/office/powerpoint/2010/main" val="2054622008"/>
+      </p:ext>
+    </p:extLst>
+  </p:cSld>
+  <p:clrMapOvr>
+    <a:masterClrMapping/>
+  </p:clrMapOvr>
+  <p:timing>
+    <p:tnLst>
+      <p:par>
+        <p:cTn id="1" dur="indefinite" restart="never" nodeType="tmRoot"/>
+      </p:par>
+    </p:tnLst>
+  </p:timing>
+</p:sld>
+</file>
+
+<file path=ppt/slides/slide13.xml><?xml version="1.0" encoding="utf-8"?>
 <p:sld xmlns:a="http://schemas.openxmlformats.org/drawingml/2006/main" xmlns:r="http://schemas.openxmlformats.org/officeDocument/2006/relationships" xmlns:p="http://schemas.openxmlformats.org/presentationml/2006/main">
   <p:cSld>
     <p:spTree>
@@ -5079,7 +5521,7 @@
           <a:p>
             <a:fld id="{DF7E9A30-B352-493C-9BED-B66D9B0B1F1E}" type="slidenum">
               <a:rPr lang="en-US" smtClean="0"/>
-              <a:t>10</a:t>
+              <a:t>13</a:t>
             </a:fld>
             <a:endParaRPr lang="en-US" dirty="0"/>
           </a:p>
@@ -5836,7 +6278,7 @@
 </p:sld>
 </file>
 
-<file path=ppt/slides/slide11.xml><?xml version="1.0" encoding="utf-8"?>
+<file path=ppt/slides/slide14.xml><?xml version="1.0" encoding="utf-8"?>
 <p:sld xmlns:a="http://schemas.openxmlformats.org/drawingml/2006/main" xmlns:r="http://schemas.openxmlformats.org/officeDocument/2006/relationships" xmlns:p="http://schemas.openxmlformats.org/presentationml/2006/main">
   <p:cSld>
     <p:spTree>
@@ -5908,7 +6350,7 @@
           <a:p>
             <a:fld id="{DF7E9A30-B352-493C-9BED-B66D9B0B1F1E}" type="slidenum">
               <a:rPr lang="en-US" smtClean="0"/>
-              <a:t>11</a:t>
+              <a:t>14</a:t>
             </a:fld>
             <a:endParaRPr lang="en-US" dirty="0"/>
           </a:p>
@@ -6506,7 +6948,7 @@
             <a:fld id="{DF7E9A30-B352-493C-9BED-B66D9B0B1F1E}" type="slidenum">
               <a:rPr lang="en-US" smtClean="0"/>
               <a:pPr/>
-              <a:t>11</a:t>
+              <a:t>14</a:t>
             </a:fld>
             <a:endParaRPr lang="en-US" dirty="0"/>
           </a:p>
@@ -8233,7 +8675,7 @@
 </p:sld>
 </file>
 
-<file path=ppt/slides/slide12.xml><?xml version="1.0" encoding="utf-8"?>
+<file path=ppt/slides/slide15.xml><?xml version="1.0" encoding="utf-8"?>
 <p:sld xmlns:a="http://schemas.openxmlformats.org/drawingml/2006/main" xmlns:r="http://schemas.openxmlformats.org/officeDocument/2006/relationships" xmlns:p="http://schemas.openxmlformats.org/presentationml/2006/main">
   <p:cSld>
     <p:spTree>
@@ -8305,7 +8747,7 @@
           <a:p>
             <a:fld id="{DF7E9A30-B352-493C-9BED-B66D9B0B1F1E}" type="slidenum">
               <a:rPr lang="en-US" smtClean="0"/>
-              <a:t>12</a:t>
+              <a:t>15</a:t>
             </a:fld>
             <a:endParaRPr lang="en-US" dirty="0"/>
           </a:p>
@@ -8903,7 +9345,7 @@
             <a:fld id="{DF7E9A30-B352-493C-9BED-B66D9B0B1F1E}" type="slidenum">
               <a:rPr lang="en-US" smtClean="0"/>
               <a:pPr/>
-              <a:t>12</a:t>
+              <a:t>15</a:t>
             </a:fld>
             <a:endParaRPr lang="en-US" dirty="0"/>
           </a:p>
@@ -10330,7 +10772,7 @@
 </p:sld>
 </file>
 
-<file path=ppt/slides/slide13.xml><?xml version="1.0" encoding="utf-8"?>
+<file path=ppt/slides/slide16.xml><?xml version="1.0" encoding="utf-8"?>
 <p:sld xmlns:a="http://schemas.openxmlformats.org/drawingml/2006/main" xmlns:r="http://schemas.openxmlformats.org/officeDocument/2006/relationships" xmlns:p="http://schemas.openxmlformats.org/presentationml/2006/main">
   <p:cSld>
     <p:spTree>
@@ -11053,7 +11495,7 @@
           <a:p>
             <a:fld id="{DF7E9A30-B352-493C-9BED-B66D9B0B1F1E}" type="slidenum">
               <a:rPr lang="en-US" smtClean="0"/>
-              <a:t>13</a:t>
+              <a:t>16</a:t>
             </a:fld>
             <a:endParaRPr lang="en-US" dirty="0"/>
           </a:p>
@@ -13104,7 +13546,7 @@
 </p:sld>
 </file>
 
-<file path=ppt/slides/slide14.xml><?xml version="1.0" encoding="utf-8"?>
+<file path=ppt/slides/slide17.xml><?xml version="1.0" encoding="utf-8"?>
 <p:sld xmlns:a="http://schemas.openxmlformats.org/drawingml/2006/main" xmlns:r="http://schemas.openxmlformats.org/officeDocument/2006/relationships" xmlns:p="http://schemas.openxmlformats.org/presentationml/2006/main">
   <p:cSld>
     <p:spTree>
@@ -13145,9 +13587,32 @@
           </a:p>
         </p:txBody>
       </p:sp>
+      <p:sp>
+        <p:nvSpPr>
+          <p:cNvPr id="7" name="Slide Number Placeholder 6"/>
+          <p:cNvSpPr>
+            <a:spLocks noGrp="1"/>
+          </p:cNvSpPr>
+          <p:nvPr>
+            <p:ph type="sldNum" sz="quarter" idx="12"/>
+          </p:nvPr>
+        </p:nvSpPr>
+        <p:spPr/>
+        <p:txBody>
+          <a:bodyPr/>
+          <a:lstStyle/>
+          <a:p>
+            <a:fld id="{DF7E9A30-B352-493C-9BED-B66D9B0B1F1E}" type="slidenum">
+              <a:rPr lang="en-US" smtClean="0"/>
+              <a:t>17</a:t>
+            </a:fld>
+            <a:endParaRPr lang="en-US" dirty="0"/>
+          </a:p>
+        </p:txBody>
+      </p:sp>
       <p:pic>
         <p:nvPicPr>
-          <p:cNvPr id="5125" name="Picture 5"/>
+          <p:cNvPr id="4098" name="Picture 2"/>
           <p:cNvPicPr>
             <a:picLocks noChangeAspect="1" noChangeArrowheads="1"/>
           </p:cNvPicPr>
@@ -13168,8 +13633,8 @@
         </p:blipFill>
         <p:spPr bwMode="auto">
           <a:xfrm>
-            <a:off x="1043608" y="1124744"/>
-            <a:ext cx="6842917" cy="5643582"/>
+            <a:off x="2123728" y="1196752"/>
+            <a:ext cx="4968552" cy="5311287"/>
           </a:xfrm>
           <a:prstGeom prst="rect">
             <a:avLst/>
@@ -13209,29 +13674,6 @@
           </a:extLst>
         </p:spPr>
       </p:pic>
-      <p:sp>
-        <p:nvSpPr>
-          <p:cNvPr id="7" name="Slide Number Placeholder 6"/>
-          <p:cNvSpPr>
-            <a:spLocks noGrp="1"/>
-          </p:cNvSpPr>
-          <p:nvPr>
-            <p:ph type="sldNum" sz="quarter" idx="12"/>
-          </p:nvPr>
-        </p:nvSpPr>
-        <p:spPr/>
-        <p:txBody>
-          <a:bodyPr/>
-          <a:lstStyle/>
-          <a:p>
-            <a:fld id="{DF7E9A30-B352-493C-9BED-B66D9B0B1F1E}" type="slidenum">
-              <a:rPr lang="en-US" smtClean="0"/>
-              <a:t>14</a:t>
-            </a:fld>
-            <a:endParaRPr lang="en-US" dirty="0"/>
-          </a:p>
-        </p:txBody>
-      </p:sp>
     </p:spTree>
     <p:extLst>
       <p:ext uri="{BB962C8B-B14F-4D97-AF65-F5344CB8AC3E}">
@@ -13252,7 +13694,7 @@
 </p:sld>
 </file>
 
-<file path=ppt/slides/slide15.xml><?xml version="1.0" encoding="utf-8"?>
+<file path=ppt/slides/slide18.xml><?xml version="1.0" encoding="utf-8"?>
 <p:sld xmlns:a="http://schemas.openxmlformats.org/drawingml/2006/main" xmlns:r="http://schemas.openxmlformats.org/officeDocument/2006/relationships" xmlns:p="http://schemas.openxmlformats.org/presentationml/2006/main">
   <p:cSld>
     <p:spTree>
@@ -13541,7 +13983,7 @@
           <a:p>
             <a:fld id="{DF7E9A30-B352-493C-9BED-B66D9B0B1F1E}" type="slidenum">
               <a:rPr lang="en-US" smtClean="0"/>
-              <a:t>15</a:t>
+              <a:t>18</a:t>
             </a:fld>
             <a:endParaRPr lang="en-US" dirty="0"/>
           </a:p>
@@ -13620,7 +14062,7 @@
         <p:spPr/>
         <p:txBody>
           <a:bodyPr>
-            <a:normAutofit fontScale="92500" lnSpcReduction="20000"/>
+            <a:normAutofit fontScale="85000" lnSpcReduction="20000"/>
           </a:bodyPr>
           <a:lstStyle/>
           <a:p>
@@ -13668,8 +14110,20 @@
             <a:pPr lvl="1"/>
             <a:r>
               <a:rPr lang="en-US" dirty="0" smtClean="0"/>
-              <a:t>System Diagram</a:t>
-            </a:r>
+              <a:t>System </a:t>
+            </a:r>
+            <a:r>
+              <a:rPr lang="en-US" dirty="0" smtClean="0"/>
+              <a:t>Diagram</a:t>
+            </a:r>
+          </a:p>
+          <a:p>
+            <a:pPr lvl="1"/>
+            <a:r>
+              <a:rPr lang="en-US" dirty="0" smtClean="0"/>
+              <a:t>High Level Class Diagrams</a:t>
+            </a:r>
+            <a:endParaRPr lang="en-US" dirty="0" smtClean="0"/>
           </a:p>
           <a:p>
             <a:r>

</xml_diff>

<commit_message>
added new project for no-watermarks printing. updated mid_sem presentation with no-watermarks umls.
</commit_message>
<xml_diff>
--- a/food-center/docs/mid_sem.pptx
+++ b/food-center/docs/mid_sem.pptx
@@ -5,7 +5,7 @@
     <p:sldMasterId id="2147483660" r:id="rId1"/>
   </p:sldMasterIdLst>
   <p:notesMasterIdLst>
-    <p:notesMasterId r:id="rId20"/>
+    <p:notesMasterId r:id="rId18"/>
   </p:notesMasterIdLst>
   <p:sldIdLst>
     <p:sldId id="256" r:id="rId2"/>
@@ -18,14 +18,12 @@
     <p:sldId id="271" r:id="rId9"/>
     <p:sldId id="265" r:id="rId10"/>
     <p:sldId id="276" r:id="rId11"/>
-    <p:sldId id="277" r:id="rId12"/>
-    <p:sldId id="278" r:id="rId13"/>
-    <p:sldId id="258" r:id="rId14"/>
-    <p:sldId id="273" r:id="rId15"/>
-    <p:sldId id="274" r:id="rId16"/>
-    <p:sldId id="261" r:id="rId17"/>
-    <p:sldId id="257" r:id="rId18"/>
-    <p:sldId id="272" r:id="rId19"/>
+    <p:sldId id="258" r:id="rId12"/>
+    <p:sldId id="273" r:id="rId13"/>
+    <p:sldId id="274" r:id="rId14"/>
+    <p:sldId id="261" r:id="rId15"/>
+    <p:sldId id="257" r:id="rId16"/>
+    <p:sldId id="272" r:id="rId17"/>
   </p:sldIdLst>
   <p:sldSz cx="9144000" cy="6858000" type="screen4x3"/>
   <p:notesSz cx="6858000" cy="9144000"/>
@@ -209,7 +207,7 @@
           <a:p>
             <a:fld id="{D9B0BE01-D5BF-4D34-A5B1-06B957001080}" type="datetimeFigureOut">
               <a:rPr lang="he-IL" smtClean="0"/>
-              <a:t>ג'/טבת/תשע"ג</a:t>
+              <a:t>ו'/טבת/תשע"ג</a:t>
             </a:fld>
             <a:endParaRPr lang="he-IL"/>
           </a:p>
@@ -626,7 +624,7 @@
           <a:p>
             <a:fld id="{0C8F25D5-F4F7-4B33-847F-6FA75A957AFF}" type="slidenum">
               <a:rPr lang="he-IL" smtClean="0"/>
-              <a:t>17</a:t>
+              <a:t>15</a:t>
             </a:fld>
             <a:endParaRPr lang="he-IL"/>
           </a:p>
@@ -821,7 +819,7 @@
             <a:pPr eaLnBrk="1" latinLnBrk="0" hangingPunct="1"/>
             <a:fld id="{DF030894-FDF1-49AF-8058-4C55B35AF967}" type="datetime1">
               <a:rPr lang="en-US" smtClean="0"/>
-              <a:t>12/16/2012</a:t>
+              <a:t>12/19/2012</a:t>
             </a:fld>
             <a:endParaRPr lang="en-US"/>
           </a:p>
@@ -971,7 +969,7 @@
             <a:pPr eaLnBrk="1" latinLnBrk="0" hangingPunct="1"/>
             <a:fld id="{1C69CC89-E9F8-4835-8AA8-7B4688FD7922}" type="datetime1">
               <a:rPr lang="en-US" smtClean="0"/>
-              <a:t>12/16/2012</a:t>
+              <a:t>12/19/2012</a:t>
             </a:fld>
             <a:endParaRPr lang="en-US"/>
           </a:p>
@@ -1148,7 +1146,7 @@
             <a:pPr eaLnBrk="1" latinLnBrk="0" hangingPunct="1"/>
             <a:fld id="{9FB13C8F-7327-4072-B74E-5AB672FAA917}" type="datetime1">
               <a:rPr lang="en-US" smtClean="0"/>
-              <a:t>12/16/2012</a:t>
+              <a:t>12/19/2012</a:t>
             </a:fld>
             <a:endParaRPr lang="en-US"/>
           </a:p>
@@ -1331,7 +1329,7 @@
             <a:pPr eaLnBrk="1" latinLnBrk="0" hangingPunct="1"/>
             <a:fld id="{F6DB66CA-DB78-4911-87A4-76C50FE88C79}" type="datetime1">
               <a:rPr lang="en-US" smtClean="0"/>
-              <a:t>12/16/2012</a:t>
+              <a:t>12/19/2012</a:t>
             </a:fld>
             <a:endParaRPr lang="en-US"/>
           </a:p>
@@ -1573,7 +1571,7 @@
             <a:pPr eaLnBrk="1" latinLnBrk="0" hangingPunct="1"/>
             <a:fld id="{EE53196A-85F1-41ED-B452-8CA5D27E152D}" type="datetime1">
               <a:rPr lang="en-US" smtClean="0"/>
-              <a:t>12/16/2012</a:t>
+              <a:t>12/19/2012</a:t>
             </a:fld>
             <a:endParaRPr lang="en-US"/>
           </a:p>
@@ -1871,7 +1869,7 @@
             <a:pPr eaLnBrk="1" latinLnBrk="0" hangingPunct="1"/>
             <a:fld id="{79BA271D-E08A-4171-B117-65FB134BE1D8}" type="datetime1">
               <a:rPr lang="en-US" smtClean="0"/>
-              <a:t>12/16/2012</a:t>
+              <a:t>12/19/2012</a:t>
             </a:fld>
             <a:endParaRPr lang="en-US"/>
           </a:p>
@@ -2257,7 +2255,7 @@
             <a:pPr eaLnBrk="1" latinLnBrk="0" hangingPunct="1"/>
             <a:fld id="{69AB665B-3DBD-4426-BA43-87FCF0529618}" type="datetime1">
               <a:rPr lang="en-US" smtClean="0"/>
-              <a:t>12/16/2012</a:t>
+              <a:t>12/19/2012</a:t>
             </a:fld>
             <a:endParaRPr lang="en-US"/>
           </a:p>
@@ -2432,7 +2430,7 @@
             <a:pPr eaLnBrk="1" latinLnBrk="0" hangingPunct="1"/>
             <a:fld id="{1DE19FB1-A3B4-4E8C-88F2-DB29773F5936}" type="datetime1">
               <a:rPr lang="en-US" smtClean="0"/>
-              <a:t>12/16/2012</a:t>
+              <a:t>12/19/2012</a:t>
             </a:fld>
             <a:endParaRPr lang="en-US"/>
           </a:p>
@@ -2524,7 +2522,7 @@
             <a:pPr eaLnBrk="1" latinLnBrk="0" hangingPunct="1"/>
             <a:fld id="{CE580D32-CFE7-4479-880D-8DC22CFC80B6}" type="datetime1">
               <a:rPr lang="en-US" smtClean="0"/>
-              <a:t>12/16/2012</a:t>
+              <a:t>12/19/2012</a:t>
             </a:fld>
             <a:endParaRPr lang="en-US"/>
           </a:p>
@@ -2821,7 +2819,7 @@
             <a:pPr eaLnBrk="1" latinLnBrk="0" hangingPunct="1"/>
             <a:fld id="{2384A284-52FE-4810-8277-CC75EC1C1622}" type="datetime1">
               <a:rPr lang="en-US" smtClean="0"/>
-              <a:t>12/16/2012</a:t>
+              <a:t>12/19/2012</a:t>
             </a:fld>
             <a:endParaRPr lang="en-US"/>
           </a:p>
@@ -2957,7 +2955,7 @@
             <a:pPr eaLnBrk="1" latinLnBrk="0" hangingPunct="1"/>
             <a:fld id="{9FD48A97-779D-49F9-88B9-1B72A67BF81B}" type="datetime1">
               <a:rPr lang="en-US" smtClean="0"/>
-              <a:t>12/16/2012</a:t>
+              <a:t>12/19/2012</a:t>
             </a:fld>
             <a:endParaRPr lang="en-US"/>
           </a:p>
@@ -3262,7 +3260,7 @@
             <a:pPr algn="l" eaLnBrk="1" latinLnBrk="0" hangingPunct="1"/>
             <a:fld id="{839E7CE6-A2D5-41DF-8449-C89B850264C5}" type="datetime1">
               <a:rPr lang="en-US" smtClean="0"/>
-              <a:t>12/16/2012</a:t>
+              <a:t>12/19/2012</a:t>
             </a:fld>
             <a:endParaRPr lang="en-US" dirty="0">
               <a:solidFill>
@@ -4115,7 +4113,7 @@
           <a:bodyPr/>
           <a:lstStyle/>
           <a:p>
-            <a:endParaRPr lang="he-IL"/>
+            <a:endParaRPr lang="he-IL" i="1" dirty="0"/>
           </a:p>
         </p:txBody>
       </p:sp>
@@ -4144,7 +4142,7 @@
       </p:sp>
       <p:pic>
         <p:nvPicPr>
-          <p:cNvPr id="1026" name="Picture 2" descr="C:\workspace\food-center\food-center\docs\hilevel_db.png"/>
+          <p:cNvPr id="1027" name="Picture 3"/>
           <p:cNvPicPr>
             <a:picLocks noChangeAspect="1" noChangeArrowheads="1"/>
           </p:cNvPicPr>
@@ -4165,20 +4163,43 @@
         </p:blipFill>
         <p:spPr bwMode="auto">
           <a:xfrm>
-            <a:off x="971600" y="1567459"/>
-            <a:ext cx="7272808" cy="4556729"/>
+            <a:off x="395536" y="1124744"/>
+            <a:ext cx="8440669" cy="5328592"/>
           </a:xfrm>
           <a:prstGeom prst="rect">
             <a:avLst/>
           </a:prstGeom>
           <a:noFill/>
+          <a:ln>
+            <a:noFill/>
+          </a:ln>
+          <a:effectLst/>
           <a:extLst>
             <a:ext uri="{909E8E84-426E-40DD-AFC4-6F175D3DCCD1}">
               <a14:hiddenFill xmlns:a14="http://schemas.microsoft.com/office/drawing/2010/main">
                 <a:solidFill>
-                  <a:srgbClr val="FFFFFF"/>
+                  <a:schemeClr val="accent1"/>
                 </a:solidFill>
               </a14:hiddenFill>
+            </a:ext>
+            <a:ext uri="{91240B29-F687-4F45-9708-019B960494DF}">
+              <a14:hiddenLine xmlns:a14="http://schemas.microsoft.com/office/drawing/2010/main" w="9525">
+                <a:solidFill>
+                  <a:schemeClr val="tx1"/>
+                </a:solidFill>
+                <a:miter lim="800000"/>
+                <a:headEnd/>
+                <a:tailEnd/>
+              </a14:hiddenLine>
+            </a:ext>
+            <a:ext uri="{AF507438-7753-43E0-B8FC-AC1667EBCBE1}">
+              <a14:hiddenEffects xmlns:a14="http://schemas.microsoft.com/office/drawing/2010/main">
+                <a:effectLst>
+                  <a:outerShdw dist="35921" dir="2700000" algn="ctr" rotWithShape="0">
+                    <a:schemeClr val="bg2"/>
+                  </a:outerShdw>
+                </a:effectLst>
+              </a14:hiddenEffects>
             </a:ext>
           </a:extLst>
         </p:spPr>
@@ -4204,294 +4225,6 @@
 </file>
 
 <file path=ppt/slides/slide11.xml><?xml version="1.0" encoding="utf-8"?>
-<p:sld xmlns:a="http://schemas.openxmlformats.org/drawingml/2006/main" xmlns:r="http://schemas.openxmlformats.org/officeDocument/2006/relationships" xmlns:p="http://schemas.openxmlformats.org/presentationml/2006/main">
-  <p:cSld>
-    <p:spTree>
-      <p:nvGrpSpPr>
-        <p:cNvPr id="1" name=""/>
-        <p:cNvGrpSpPr/>
-        <p:nvPr/>
-      </p:nvGrpSpPr>
-      <p:grpSpPr>
-        <a:xfrm>
-          <a:off x="0" y="0"/>
-          <a:ext cx="0" cy="0"/>
-          <a:chOff x="0" y="0"/>
-          <a:chExt cx="0" cy="0"/>
-        </a:xfrm>
-      </p:grpSpPr>
-      <p:sp>
-        <p:nvSpPr>
-          <p:cNvPr id="2" name="Title 1"/>
-          <p:cNvSpPr>
-            <a:spLocks noGrp="1"/>
-          </p:cNvSpPr>
-          <p:nvPr>
-            <p:ph type="title"/>
-          </p:nvPr>
-        </p:nvSpPr>
-        <p:spPr/>
-        <p:txBody>
-          <a:bodyPr>
-            <a:normAutofit fontScale="90000"/>
-          </a:bodyPr>
-          <a:lstStyle/>
-          <a:p>
-            <a:r>
-              <a:rPr lang="en-US" dirty="0" smtClean="0"/>
-              <a:t>HIGH level android class diagram(how)</a:t>
-            </a:r>
-            <a:endParaRPr lang="he-IL" dirty="0"/>
-          </a:p>
-        </p:txBody>
-      </p:sp>
-      <p:sp>
-        <p:nvSpPr>
-          <p:cNvPr id="3" name="Content Placeholder 2"/>
-          <p:cNvSpPr>
-            <a:spLocks noGrp="1"/>
-          </p:cNvSpPr>
-          <p:nvPr>
-            <p:ph idx="1"/>
-          </p:nvPr>
-        </p:nvSpPr>
-        <p:spPr/>
-        <p:txBody>
-          <a:bodyPr/>
-          <a:lstStyle/>
-          <a:p>
-            <a:endParaRPr lang="he-IL"/>
-          </a:p>
-        </p:txBody>
-      </p:sp>
-      <p:sp>
-        <p:nvSpPr>
-          <p:cNvPr id="4" name="Slide Number Placeholder 3"/>
-          <p:cNvSpPr>
-            <a:spLocks noGrp="1"/>
-          </p:cNvSpPr>
-          <p:nvPr>
-            <p:ph type="sldNum" sz="quarter" idx="12"/>
-          </p:nvPr>
-        </p:nvSpPr>
-        <p:spPr/>
-        <p:txBody>
-          <a:bodyPr/>
-          <a:lstStyle/>
-          <a:p>
-            <a:fld id="{DF7E9A30-B352-493C-9BED-B66D9B0B1F1E}" type="slidenum">
-              <a:rPr lang="en-US" smtClean="0"/>
-              <a:t>11</a:t>
-            </a:fld>
-            <a:endParaRPr lang="en-US" dirty="0"/>
-          </a:p>
-        </p:txBody>
-      </p:sp>
-      <p:pic>
-        <p:nvPicPr>
-          <p:cNvPr id="2050" name="Picture 2" descr="C:\workspace\food-center\food-center\docs\hilevel_android.png"/>
-          <p:cNvPicPr>
-            <a:picLocks noChangeAspect="1" noChangeArrowheads="1"/>
-          </p:cNvPicPr>
-          <p:nvPr/>
-        </p:nvPicPr>
-        <p:blipFill>
-          <a:blip r:embed="rId2">
-            <a:extLst>
-              <a:ext uri="{28A0092B-C50C-407E-A947-70E740481C1C}">
-                <a14:useLocalDpi xmlns:a14="http://schemas.microsoft.com/office/drawing/2010/main" val="0"/>
-              </a:ext>
-            </a:extLst>
-          </a:blip>
-          <a:srcRect/>
-          <a:stretch>
-            <a:fillRect/>
-          </a:stretch>
-        </p:blipFill>
-        <p:spPr bwMode="auto">
-          <a:xfrm>
-            <a:off x="467544" y="1340768"/>
-            <a:ext cx="7942634" cy="5254682"/>
-          </a:xfrm>
-          <a:prstGeom prst="rect">
-            <a:avLst/>
-          </a:prstGeom>
-          <a:noFill/>
-          <a:extLst>
-            <a:ext uri="{909E8E84-426E-40DD-AFC4-6F175D3DCCD1}">
-              <a14:hiddenFill xmlns:a14="http://schemas.microsoft.com/office/drawing/2010/main">
-                <a:solidFill>
-                  <a:srgbClr val="FFFFFF"/>
-                </a:solidFill>
-              </a14:hiddenFill>
-            </a:ext>
-          </a:extLst>
-        </p:spPr>
-      </p:pic>
-    </p:spTree>
-    <p:extLst>
-      <p:ext uri="{BB962C8B-B14F-4D97-AF65-F5344CB8AC3E}">
-        <p14:creationId xmlns:p14="http://schemas.microsoft.com/office/powerpoint/2010/main" val="754311153"/>
-      </p:ext>
-    </p:extLst>
-  </p:cSld>
-  <p:clrMapOvr>
-    <a:masterClrMapping/>
-  </p:clrMapOvr>
-  <p:timing>
-    <p:tnLst>
-      <p:par>
-        <p:cTn id="1" dur="indefinite" restart="never" nodeType="tmRoot"/>
-      </p:par>
-    </p:tnLst>
-  </p:timing>
-</p:sld>
-</file>
-
-<file path=ppt/slides/slide12.xml><?xml version="1.0" encoding="utf-8"?>
-<p:sld xmlns:a="http://schemas.openxmlformats.org/drawingml/2006/main" xmlns:r="http://schemas.openxmlformats.org/officeDocument/2006/relationships" xmlns:p="http://schemas.openxmlformats.org/presentationml/2006/main">
-  <p:cSld>
-    <p:spTree>
-      <p:nvGrpSpPr>
-        <p:cNvPr id="1" name=""/>
-        <p:cNvGrpSpPr/>
-        <p:nvPr/>
-      </p:nvGrpSpPr>
-      <p:grpSpPr>
-        <a:xfrm>
-          <a:off x="0" y="0"/>
-          <a:ext cx="0" cy="0"/>
-          <a:chOff x="0" y="0"/>
-          <a:chExt cx="0" cy="0"/>
-        </a:xfrm>
-      </p:grpSpPr>
-      <p:sp>
-        <p:nvSpPr>
-          <p:cNvPr id="2" name="Title 1"/>
-          <p:cNvSpPr>
-            <a:spLocks noGrp="1"/>
-          </p:cNvSpPr>
-          <p:nvPr>
-            <p:ph type="title"/>
-          </p:nvPr>
-        </p:nvSpPr>
-        <p:spPr/>
-        <p:txBody>
-          <a:bodyPr/>
-          <a:lstStyle/>
-          <a:p>
-            <a:r>
-              <a:rPr lang="en-US" dirty="0" smtClean="0"/>
-              <a:t>High level web class diagram (HOW)</a:t>
-            </a:r>
-            <a:endParaRPr lang="he-IL" dirty="0"/>
-          </a:p>
-        </p:txBody>
-      </p:sp>
-      <p:sp>
-        <p:nvSpPr>
-          <p:cNvPr id="3" name="Content Placeholder 2"/>
-          <p:cNvSpPr>
-            <a:spLocks noGrp="1"/>
-          </p:cNvSpPr>
-          <p:nvPr>
-            <p:ph idx="1"/>
-          </p:nvPr>
-        </p:nvSpPr>
-        <p:spPr/>
-        <p:txBody>
-          <a:bodyPr/>
-          <a:lstStyle/>
-          <a:p>
-            <a:endParaRPr lang="he-IL"/>
-          </a:p>
-        </p:txBody>
-      </p:sp>
-      <p:sp>
-        <p:nvSpPr>
-          <p:cNvPr id="4" name="Slide Number Placeholder 3"/>
-          <p:cNvSpPr>
-            <a:spLocks noGrp="1"/>
-          </p:cNvSpPr>
-          <p:nvPr>
-            <p:ph type="sldNum" sz="quarter" idx="12"/>
-          </p:nvPr>
-        </p:nvSpPr>
-        <p:spPr/>
-        <p:txBody>
-          <a:bodyPr/>
-          <a:lstStyle/>
-          <a:p>
-            <a:fld id="{DF7E9A30-B352-493C-9BED-B66D9B0B1F1E}" type="slidenum">
-              <a:rPr lang="en-US" smtClean="0"/>
-              <a:t>12</a:t>
-            </a:fld>
-            <a:endParaRPr lang="en-US" dirty="0"/>
-          </a:p>
-        </p:txBody>
-      </p:sp>
-      <p:pic>
-        <p:nvPicPr>
-          <p:cNvPr id="3074" name="Picture 2" descr="C:\workspace\food-center\food-center\docs\hilevel_web.png"/>
-          <p:cNvPicPr>
-            <a:picLocks noChangeAspect="1" noChangeArrowheads="1"/>
-          </p:cNvPicPr>
-          <p:nvPr/>
-        </p:nvPicPr>
-        <p:blipFill>
-          <a:blip r:embed="rId2">
-            <a:extLst>
-              <a:ext uri="{28A0092B-C50C-407E-A947-70E740481C1C}">
-                <a14:useLocalDpi xmlns:a14="http://schemas.microsoft.com/office/drawing/2010/main" val="0"/>
-              </a:ext>
-            </a:extLst>
-          </a:blip>
-          <a:srcRect/>
-          <a:stretch>
-            <a:fillRect/>
-          </a:stretch>
-        </p:blipFill>
-        <p:spPr bwMode="auto">
-          <a:xfrm>
-            <a:off x="251520" y="1628800"/>
-            <a:ext cx="8721929" cy="4281860"/>
-          </a:xfrm>
-          <a:prstGeom prst="rect">
-            <a:avLst/>
-          </a:prstGeom>
-          <a:noFill/>
-          <a:extLst>
-            <a:ext uri="{909E8E84-426E-40DD-AFC4-6F175D3DCCD1}">
-              <a14:hiddenFill xmlns:a14="http://schemas.microsoft.com/office/drawing/2010/main">
-                <a:solidFill>
-                  <a:srgbClr val="FFFFFF"/>
-                </a:solidFill>
-              </a14:hiddenFill>
-            </a:ext>
-          </a:extLst>
-        </p:spPr>
-      </p:pic>
-    </p:spTree>
-    <p:extLst>
-      <p:ext uri="{BB962C8B-B14F-4D97-AF65-F5344CB8AC3E}">
-        <p14:creationId xmlns:p14="http://schemas.microsoft.com/office/powerpoint/2010/main" val="2054622008"/>
-      </p:ext>
-    </p:extLst>
-  </p:cSld>
-  <p:clrMapOvr>
-    <a:masterClrMapping/>
-  </p:clrMapOvr>
-  <p:timing>
-    <p:tnLst>
-      <p:par>
-        <p:cTn id="1" dur="indefinite" restart="never" nodeType="tmRoot"/>
-      </p:par>
-    </p:tnLst>
-  </p:timing>
-</p:sld>
-</file>
-
-<file path=ppt/slides/slide13.xml><?xml version="1.0" encoding="utf-8"?>
 <p:sld xmlns:a="http://schemas.openxmlformats.org/drawingml/2006/main" xmlns:r="http://schemas.openxmlformats.org/officeDocument/2006/relationships" xmlns:p="http://schemas.openxmlformats.org/presentationml/2006/main">
   <p:cSld>
     <p:spTree>
@@ -5521,7 +5254,7 @@
           <a:p>
             <a:fld id="{DF7E9A30-B352-493C-9BED-B66D9B0B1F1E}" type="slidenum">
               <a:rPr lang="en-US" smtClean="0"/>
-              <a:t>13</a:t>
+              <a:t>11</a:t>
             </a:fld>
             <a:endParaRPr lang="en-US" dirty="0"/>
           </a:p>
@@ -6278,7 +6011,7 @@
 </p:sld>
 </file>
 
-<file path=ppt/slides/slide14.xml><?xml version="1.0" encoding="utf-8"?>
+<file path=ppt/slides/slide12.xml><?xml version="1.0" encoding="utf-8"?>
 <p:sld xmlns:a="http://schemas.openxmlformats.org/drawingml/2006/main" xmlns:r="http://schemas.openxmlformats.org/officeDocument/2006/relationships" xmlns:p="http://schemas.openxmlformats.org/presentationml/2006/main">
   <p:cSld>
     <p:spTree>
@@ -6350,7 +6083,7 @@
           <a:p>
             <a:fld id="{DF7E9A30-B352-493C-9BED-B66D9B0B1F1E}" type="slidenum">
               <a:rPr lang="en-US" smtClean="0"/>
-              <a:t>14</a:t>
+              <a:t>12</a:t>
             </a:fld>
             <a:endParaRPr lang="en-US" dirty="0"/>
           </a:p>
@@ -6948,7 +6681,7 @@
             <a:fld id="{DF7E9A30-B352-493C-9BED-B66D9B0B1F1E}" type="slidenum">
               <a:rPr lang="en-US" smtClean="0"/>
               <a:pPr/>
-              <a:t>14</a:t>
+              <a:t>12</a:t>
             </a:fld>
             <a:endParaRPr lang="en-US" dirty="0"/>
           </a:p>
@@ -8675,7 +8408,7 @@
 </p:sld>
 </file>
 
-<file path=ppt/slides/slide15.xml><?xml version="1.0" encoding="utf-8"?>
+<file path=ppt/slides/slide13.xml><?xml version="1.0" encoding="utf-8"?>
 <p:sld xmlns:a="http://schemas.openxmlformats.org/drawingml/2006/main" xmlns:r="http://schemas.openxmlformats.org/officeDocument/2006/relationships" xmlns:p="http://schemas.openxmlformats.org/presentationml/2006/main">
   <p:cSld>
     <p:spTree>
@@ -8747,7 +8480,7 @@
           <a:p>
             <a:fld id="{DF7E9A30-B352-493C-9BED-B66D9B0B1F1E}" type="slidenum">
               <a:rPr lang="en-US" smtClean="0"/>
-              <a:t>15</a:t>
+              <a:t>13</a:t>
             </a:fld>
             <a:endParaRPr lang="en-US" dirty="0"/>
           </a:p>
@@ -9345,7 +9078,7 @@
             <a:fld id="{DF7E9A30-B352-493C-9BED-B66D9B0B1F1E}" type="slidenum">
               <a:rPr lang="en-US" smtClean="0"/>
               <a:pPr/>
-              <a:t>15</a:t>
+              <a:t>13</a:t>
             </a:fld>
             <a:endParaRPr lang="en-US" dirty="0"/>
           </a:p>
@@ -10772,7 +10505,7 @@
 </p:sld>
 </file>
 
-<file path=ppt/slides/slide16.xml><?xml version="1.0" encoding="utf-8"?>
+<file path=ppt/slides/slide14.xml><?xml version="1.0" encoding="utf-8"?>
 <p:sld xmlns:a="http://schemas.openxmlformats.org/drawingml/2006/main" xmlns:r="http://schemas.openxmlformats.org/officeDocument/2006/relationships" xmlns:p="http://schemas.openxmlformats.org/presentationml/2006/main">
   <p:cSld>
     <p:spTree>
@@ -11495,7 +11228,7 @@
           <a:p>
             <a:fld id="{DF7E9A30-B352-493C-9BED-B66D9B0B1F1E}" type="slidenum">
               <a:rPr lang="en-US" smtClean="0"/>
-              <a:t>16</a:t>
+              <a:t>14</a:t>
             </a:fld>
             <a:endParaRPr lang="en-US" dirty="0"/>
           </a:p>
@@ -13546,7 +13279,7 @@
 </p:sld>
 </file>
 
-<file path=ppt/slides/slide17.xml><?xml version="1.0" encoding="utf-8"?>
+<file path=ppt/slides/slide15.xml><?xml version="1.0" encoding="utf-8"?>
 <p:sld xmlns:a="http://schemas.openxmlformats.org/drawingml/2006/main" xmlns:r="http://schemas.openxmlformats.org/officeDocument/2006/relationships" xmlns:p="http://schemas.openxmlformats.org/presentationml/2006/main">
   <p:cSld>
     <p:spTree>
@@ -13604,7 +13337,7 @@
           <a:p>
             <a:fld id="{DF7E9A30-B352-493C-9BED-B66D9B0B1F1E}" type="slidenum">
               <a:rPr lang="en-US" smtClean="0"/>
-              <a:t>17</a:t>
+              <a:t>15</a:t>
             </a:fld>
             <a:endParaRPr lang="en-US" dirty="0"/>
           </a:p>
@@ -13694,7 +13427,7 @@
 </p:sld>
 </file>
 
-<file path=ppt/slides/slide18.xml><?xml version="1.0" encoding="utf-8"?>
+<file path=ppt/slides/slide16.xml><?xml version="1.0" encoding="utf-8"?>
 <p:sld xmlns:a="http://schemas.openxmlformats.org/drawingml/2006/main" xmlns:r="http://schemas.openxmlformats.org/officeDocument/2006/relationships" xmlns:p="http://schemas.openxmlformats.org/presentationml/2006/main">
   <p:cSld>
     <p:spTree>
@@ -13983,7 +13716,7 @@
           <a:p>
             <a:fld id="{DF7E9A30-B352-493C-9BED-B66D9B0B1F1E}" type="slidenum">
               <a:rPr lang="en-US" smtClean="0"/>
-              <a:t>18</a:t>
+              <a:t>16</a:t>
             </a:fld>
             <a:endParaRPr lang="en-US" dirty="0"/>
           </a:p>
@@ -14110,11 +13843,7 @@
             <a:pPr lvl="1"/>
             <a:r>
               <a:rPr lang="en-US" dirty="0" smtClean="0"/>
-              <a:t>System </a:t>
-            </a:r>
-            <a:r>
-              <a:rPr lang="en-US" dirty="0" smtClean="0"/>
-              <a:t>Diagram</a:t>
+              <a:t>System Diagram</a:t>
             </a:r>
           </a:p>
           <a:p>
@@ -14123,7 +13852,6 @@
               <a:rPr lang="en-US" dirty="0" smtClean="0"/>
               <a:t>High Level Class Diagrams</a:t>
             </a:r>
-            <a:endParaRPr lang="en-US" dirty="0" smtClean="0"/>
           </a:p>
           <a:p>
             <a:r>
@@ -14419,9 +14147,34 @@
           </a:p>
         </p:txBody>
       </p:sp>
+      <p:sp>
+        <p:nvSpPr>
+          <p:cNvPr id="5" name="Slide Number Placeholder 4"/>
+          <p:cNvSpPr>
+            <a:spLocks noGrp="1"/>
+          </p:cNvSpPr>
+          <p:nvPr>
+            <p:ph type="sldNum" sz="quarter" idx="12"/>
+          </p:nvPr>
+        </p:nvSpPr>
+        <p:spPr/>
+        <p:txBody>
+          <a:bodyPr/>
+          <a:lstStyle/>
+          <a:p>
+            <a:pPr eaLnBrk="1" latinLnBrk="0" hangingPunct="1"/>
+            <a:fld id="{CA15C064-DD44-4CAC-873E-2D1F54821676}" type="slidenum">
+              <a:rPr kumimoji="0" lang="en-US" smtClean="0"/>
+              <a:pPr eaLnBrk="1" latinLnBrk="0" hangingPunct="1"/>
+              <a:t>4</a:t>
+            </a:fld>
+            <a:endParaRPr kumimoji="0" lang="en-US" dirty="0"/>
+          </a:p>
+        </p:txBody>
+      </p:sp>
       <p:pic>
         <p:nvPicPr>
-          <p:cNvPr id="7170" name="Picture 2" descr="C:\workspace\food-center\food-center\docs\food-center.vpp.mid_sem_uc_dia.jpg"/>
+          <p:cNvPr id="2050" name="Picture 2"/>
           <p:cNvPicPr>
             <a:picLocks noChangeAspect="1" noChangeArrowheads="1"/>
           </p:cNvPicPr>
@@ -14442,49 +14195,47 @@
         </p:blipFill>
         <p:spPr bwMode="auto">
           <a:xfrm>
-            <a:off x="323528" y="1124743"/>
-            <a:ext cx="8640960" cy="5677803"/>
+            <a:off x="467544" y="1340768"/>
+            <a:ext cx="8208912" cy="5256584"/>
           </a:xfrm>
           <a:prstGeom prst="rect">
             <a:avLst/>
           </a:prstGeom>
           <a:noFill/>
+          <a:ln>
+            <a:noFill/>
+          </a:ln>
+          <a:effectLst/>
           <a:extLst>
             <a:ext uri="{909E8E84-426E-40DD-AFC4-6F175D3DCCD1}">
               <a14:hiddenFill xmlns:a14="http://schemas.microsoft.com/office/drawing/2010/main">
                 <a:solidFill>
-                  <a:srgbClr val="FFFFFF"/>
+                  <a:schemeClr val="accent1"/>
                 </a:solidFill>
               </a14:hiddenFill>
+            </a:ext>
+            <a:ext uri="{91240B29-F687-4F45-9708-019B960494DF}">
+              <a14:hiddenLine xmlns:a14="http://schemas.microsoft.com/office/drawing/2010/main" w="9525">
+                <a:solidFill>
+                  <a:schemeClr val="tx1"/>
+                </a:solidFill>
+                <a:miter lim="800000"/>
+                <a:headEnd/>
+                <a:tailEnd/>
+              </a14:hiddenLine>
+            </a:ext>
+            <a:ext uri="{AF507438-7753-43E0-B8FC-AC1667EBCBE1}">
+              <a14:hiddenEffects xmlns:a14="http://schemas.microsoft.com/office/drawing/2010/main">
+                <a:effectLst>
+                  <a:outerShdw dist="35921" dir="2700000" algn="ctr" rotWithShape="0">
+                    <a:schemeClr val="bg2"/>
+                  </a:outerShdw>
+                </a:effectLst>
+              </a14:hiddenEffects>
             </a:ext>
           </a:extLst>
         </p:spPr>
       </p:pic>
-      <p:sp>
-        <p:nvSpPr>
-          <p:cNvPr id="5" name="Slide Number Placeholder 4"/>
-          <p:cNvSpPr>
-            <a:spLocks noGrp="1"/>
-          </p:cNvSpPr>
-          <p:nvPr>
-            <p:ph type="sldNum" sz="quarter" idx="12"/>
-          </p:nvPr>
-        </p:nvSpPr>
-        <p:spPr/>
-        <p:txBody>
-          <a:bodyPr/>
-          <a:lstStyle/>
-          <a:p>
-            <a:pPr eaLnBrk="1" latinLnBrk="0" hangingPunct="1"/>
-            <a:fld id="{CA15C064-DD44-4CAC-873E-2D1F54821676}" type="slidenum">
-              <a:rPr kumimoji="0" lang="en-US" smtClean="0"/>
-              <a:pPr eaLnBrk="1" latinLnBrk="0" hangingPunct="1"/>
-              <a:t>4</a:t>
-            </a:fld>
-            <a:endParaRPr kumimoji="0" lang="en-US" dirty="0"/>
-          </a:p>
-        </p:txBody>
-      </p:sp>
     </p:spTree>
     <p:extLst>
       <p:ext uri="{BB962C8B-B14F-4D97-AF65-F5344CB8AC3E}">

</xml_diff>